<commit_message>
Added some agenda detail
</commit_message>
<xml_diff>
--- a/Presentations/Supervisor Meetings/2024/20240209.pptx
+++ b/Presentations/Supervisor Meetings/2024/20240209.pptx
@@ -6,6 +6,7 @@
   </p:sldMasterIdLst>
   <p:sldIdLst>
     <p:sldId id="256" r:id="rId2"/>
+    <p:sldId id="257" r:id="rId3"/>
   </p:sldIdLst>
   <p:sldSz cx="12192000" cy="6858000"/>
   <p:notesSz cx="6858000" cy="9144000"/>
@@ -104,6 +105,11 @@
       </a:defRPr>
     </a:lvl9pPr>
   </p:defaultTextStyle>
+  <p:extLst>
+    <p:ext uri="{EFAFB233-063F-42B5-8137-9DF3F51BA10A}">
+      <p15:sldGuideLst xmlns:p15="http://schemas.microsoft.com/office/powerpoint/2012/main"/>
+    </p:ext>
+  </p:extLst>
 </p:presentation>
 </file>
 
@@ -111,17 +117,56 @@
 <pc:chgInfo xmlns:a="http://schemas.openxmlformats.org/drawingml/2006/main" xmlns:r="http://schemas.openxmlformats.org/officeDocument/2006/relationships" xmlns:ac="http://schemas.microsoft.com/office/drawing/2013/main/command" xmlns:pc="http://schemas.microsoft.com/office/powerpoint/2013/main/command">
   <pc:docChgLst>
     <pc:chgData name="Sean" userId="47659c31-a575-4792-8be3-61268c4ee0d6" providerId="ADAL" clId="{CA64B30F-511C-45F5-B991-1BF90300E7E0}"/>
-    <pc:docChg chg="addSld">
-      <pc:chgData name="Sean" userId="47659c31-a575-4792-8be3-61268c4ee0d6" providerId="ADAL" clId="{CA64B30F-511C-45F5-B991-1BF90300E7E0}" dt="2024-02-03T13:41:44.067" v="0" actId="680"/>
+    <pc:docChg chg="custSel addSld modSld">
+      <pc:chgData name="Sean" userId="47659c31-a575-4792-8be3-61268c4ee0d6" providerId="ADAL" clId="{CA64B30F-511C-45F5-B991-1BF90300E7E0}" dt="2024-02-03T15:45:02.204" v="112" actId="313"/>
       <pc:docMkLst>
         <pc:docMk/>
       </pc:docMkLst>
-      <pc:sldChg chg="new">
-        <pc:chgData name="Sean" userId="47659c31-a575-4792-8be3-61268c4ee0d6" providerId="ADAL" clId="{CA64B30F-511C-45F5-B991-1BF90300E7E0}" dt="2024-02-03T13:41:44.067" v="0" actId="680"/>
+      <pc:sldChg chg="modSp new mod">
+        <pc:chgData name="Sean" userId="47659c31-a575-4792-8be3-61268c4ee0d6" providerId="ADAL" clId="{CA64B30F-511C-45F5-B991-1BF90300E7E0}" dt="2024-02-03T15:42:24.809" v="27" actId="20577"/>
         <pc:sldMkLst>
           <pc:docMk/>
           <pc:sldMk cId="905190482" sldId="256"/>
         </pc:sldMkLst>
+        <pc:spChg chg="mod">
+          <ac:chgData name="Sean" userId="47659c31-a575-4792-8be3-61268c4ee0d6" providerId="ADAL" clId="{CA64B30F-511C-45F5-B991-1BF90300E7E0}" dt="2024-02-03T15:42:12.450" v="19" actId="20577"/>
+          <ac:spMkLst>
+            <pc:docMk/>
+            <pc:sldMk cId="905190482" sldId="256"/>
+            <ac:spMk id="2" creationId="{9D26D2D5-D30F-4BA4-BE2B-908BEB7AA9C6}"/>
+          </ac:spMkLst>
+        </pc:spChg>
+        <pc:spChg chg="mod">
+          <ac:chgData name="Sean" userId="47659c31-a575-4792-8be3-61268c4ee0d6" providerId="ADAL" clId="{CA64B30F-511C-45F5-B991-1BF90300E7E0}" dt="2024-02-03T15:42:24.809" v="27" actId="20577"/>
+          <ac:spMkLst>
+            <pc:docMk/>
+            <pc:sldMk cId="905190482" sldId="256"/>
+            <ac:spMk id="3" creationId="{678D1CD4-AABC-4B3E-A2CC-37ACEEC74568}"/>
+          </ac:spMkLst>
+        </pc:spChg>
+      </pc:sldChg>
+      <pc:sldChg chg="modSp new mod">
+        <pc:chgData name="Sean" userId="47659c31-a575-4792-8be3-61268c4ee0d6" providerId="ADAL" clId="{CA64B30F-511C-45F5-B991-1BF90300E7E0}" dt="2024-02-03T15:45:02.204" v="112" actId="313"/>
+        <pc:sldMkLst>
+          <pc:docMk/>
+          <pc:sldMk cId="3126834720" sldId="257"/>
+        </pc:sldMkLst>
+        <pc:spChg chg="mod">
+          <ac:chgData name="Sean" userId="47659c31-a575-4792-8be3-61268c4ee0d6" providerId="ADAL" clId="{CA64B30F-511C-45F5-B991-1BF90300E7E0}" dt="2024-02-03T15:42:56.628" v="37" actId="20577"/>
+          <ac:spMkLst>
+            <pc:docMk/>
+            <pc:sldMk cId="3126834720" sldId="257"/>
+            <ac:spMk id="2" creationId="{681D533A-3C45-4858-8E40-47B9F15C47FC}"/>
+          </ac:spMkLst>
+        </pc:spChg>
+        <pc:spChg chg="mod">
+          <ac:chgData name="Sean" userId="47659c31-a575-4792-8be3-61268c4ee0d6" providerId="ADAL" clId="{CA64B30F-511C-45F5-B991-1BF90300E7E0}" dt="2024-02-03T15:45:02.204" v="112" actId="313"/>
+          <ac:spMkLst>
+            <pc:docMk/>
+            <pc:sldMk cId="3126834720" sldId="257"/>
+            <ac:spMk id="3" creationId="{40C9001B-B62A-4D30-84D2-54AF8318DA1F}"/>
+          </ac:spMkLst>
+        </pc:spChg>
       </pc:sldChg>
     </pc:docChg>
   </pc:docChgLst>
@@ -3384,7 +3429,11 @@
           <a:bodyPr/>
           <a:lstStyle/>
           <a:p>
-            <a:endParaRPr lang="en-GB"/>
+            <a:r>
+              <a:rPr lang="en-US" dirty="0"/>
+              <a:t>Supervisory Meeting</a:t>
+            </a:r>
+            <a:endParaRPr lang="en-GB" dirty="0"/>
           </a:p>
         </p:txBody>
       </p:sp>
@@ -3409,7 +3458,11 @@
           <a:bodyPr/>
           <a:lstStyle/>
           <a:p>
-            <a:endParaRPr lang="en-GB"/>
+            <a:r>
+              <a:rPr lang="en-US" dirty="0"/>
+              <a:t>09/02/24</a:t>
+            </a:r>
+            <a:endParaRPr lang="en-GB" dirty="0"/>
           </a:p>
         </p:txBody>
       </p:sp>
@@ -3417,6 +3470,111 @@
     <p:extLst>
       <p:ext uri="{BB962C8B-B14F-4D97-AF65-F5344CB8AC3E}">
         <p14:creationId xmlns:p14="http://schemas.microsoft.com/office/powerpoint/2010/main" val="905190482"/>
+      </p:ext>
+    </p:extLst>
+  </p:cSld>
+  <p:clrMapOvr>
+    <a:masterClrMapping/>
+  </p:clrMapOvr>
+</p:sld>
+</file>
+
+<file path=ppt/slides/slide2.xml><?xml version="1.0" encoding="utf-8"?>
+<p:sld xmlns:a="http://schemas.openxmlformats.org/drawingml/2006/main" xmlns:r="http://schemas.openxmlformats.org/officeDocument/2006/relationships" xmlns:p="http://schemas.openxmlformats.org/presentationml/2006/main">
+  <p:cSld>
+    <p:spTree>
+      <p:nvGrpSpPr>
+        <p:cNvPr id="1" name=""/>
+        <p:cNvGrpSpPr/>
+        <p:nvPr/>
+      </p:nvGrpSpPr>
+      <p:grpSpPr>
+        <a:xfrm>
+          <a:off x="0" y="0"/>
+          <a:ext cx="0" cy="0"/>
+          <a:chOff x="0" y="0"/>
+          <a:chExt cx="0" cy="0"/>
+        </a:xfrm>
+      </p:grpSpPr>
+      <p:sp>
+        <p:nvSpPr>
+          <p:cNvPr id="2" name="Title 1">
+            <a:extLst>
+              <a:ext uri="{FF2B5EF4-FFF2-40B4-BE49-F238E27FC236}">
+                <a16:creationId xmlns:a16="http://schemas.microsoft.com/office/drawing/2014/main" id="{681D533A-3C45-4858-8E40-47B9F15C47FC}"/>
+              </a:ext>
+            </a:extLst>
+          </p:cNvPr>
+          <p:cNvSpPr>
+            <a:spLocks noGrp="1"/>
+          </p:cNvSpPr>
+          <p:nvPr>
+            <p:ph type="title"/>
+          </p:nvPr>
+        </p:nvSpPr>
+        <p:spPr/>
+        <p:txBody>
+          <a:bodyPr/>
+          <a:lstStyle/>
+          <a:p>
+            <a:r>
+              <a:rPr lang="en-US" dirty="0"/>
+              <a:t>Agenda	</a:t>
+            </a:r>
+            <a:endParaRPr lang="en-GB" dirty="0"/>
+          </a:p>
+        </p:txBody>
+      </p:sp>
+      <p:sp>
+        <p:nvSpPr>
+          <p:cNvPr id="3" name="Content Placeholder 2">
+            <a:extLst>
+              <a:ext uri="{FF2B5EF4-FFF2-40B4-BE49-F238E27FC236}">
+                <a16:creationId xmlns:a16="http://schemas.microsoft.com/office/drawing/2014/main" id="{40C9001B-B62A-4D30-84D2-54AF8318DA1F}"/>
+              </a:ext>
+            </a:extLst>
+          </p:cNvPr>
+          <p:cNvSpPr>
+            <a:spLocks noGrp="1"/>
+          </p:cNvSpPr>
+          <p:nvPr>
+            <p:ph idx="1"/>
+          </p:nvPr>
+        </p:nvSpPr>
+        <p:spPr/>
+        <p:txBody>
+          <a:bodyPr/>
+          <a:lstStyle/>
+          <a:p>
+            <a:r>
+              <a:rPr lang="en-US" dirty="0"/>
+              <a:t>Elevator Pitch</a:t>
+            </a:r>
+          </a:p>
+          <a:p>
+            <a:r>
+              <a:rPr lang="en-GB" dirty="0"/>
+              <a:t>Keywords Search</a:t>
+            </a:r>
+          </a:p>
+          <a:p>
+            <a:r>
+              <a:rPr lang="en-GB" dirty="0"/>
+              <a:t>Search Results	</a:t>
+            </a:r>
+          </a:p>
+          <a:p>
+            <a:pPr marL="0" indent="0">
+              <a:buNone/>
+            </a:pPr>
+            <a:endParaRPr lang="en-GB" dirty="0"/>
+          </a:p>
+        </p:txBody>
+      </p:sp>
+    </p:spTree>
+    <p:extLst>
+      <p:ext uri="{BB962C8B-B14F-4D97-AF65-F5344CB8AC3E}">
+        <p14:creationId xmlns:p14="http://schemas.microsoft.com/office/powerpoint/2010/main" val="3126834720"/>
       </p:ext>
     </p:extLst>
   </p:cSld>

</xml_diff>

<commit_message>
added some research proposal information
</commit_message>
<xml_diff>
--- a/Presentations/Supervisor Meetings/2024/20240209.pptx
+++ b/Presentations/Supervisor Meetings/2024/20240209.pptx
@@ -7,6 +7,7 @@
   <p:sldIdLst>
     <p:sldId id="256" r:id="rId2"/>
     <p:sldId id="257" r:id="rId3"/>
+    <p:sldId id="258" r:id="rId4"/>
   </p:sldIdLst>
   <p:sldSz cx="12192000" cy="6858000"/>
   <p:notesSz cx="6858000" cy="9144000"/>
@@ -113,8 +114,64 @@
 </p:presentation>
 </file>
 
+<file path=ppt/revisionInfo.xml><?xml version="1.0" encoding="utf-8"?>
+<p1510:revInfo xmlns:a="http://schemas.openxmlformats.org/drawingml/2006/main" xmlns:r="http://schemas.openxmlformats.org/officeDocument/2006/relationships" xmlns:p1510="http://schemas.microsoft.com/office/powerpoint/2015/10/main">
+  <p1510:revLst>
+    <p1510:client id="{CA64B30F-511C-45F5-B991-1BF90300E7E0}" v="2" dt="2024-02-05T19:50:47.589"/>
+  </p1510:revLst>
+</p1510:revInfo>
+</file>
+
 <file path=ppt/changesInfos/changesInfo1.xml><?xml version="1.0" encoding="utf-8"?>
 <pc:chgInfo xmlns:a="http://schemas.openxmlformats.org/drawingml/2006/main" xmlns:r="http://schemas.openxmlformats.org/officeDocument/2006/relationships" xmlns:ac="http://schemas.microsoft.com/office/drawing/2013/main/command" xmlns:pc="http://schemas.microsoft.com/office/powerpoint/2013/main/command">
+  <pc:docChgLst>
+    <pc:chgData name="Sean O Fithcheallaigh" userId="47659c31-a575-4792-8be3-61268c4ee0d6" providerId="ADAL" clId="{CA64B30F-511C-45F5-B991-1BF90300E7E0}"/>
+    <pc:docChg chg="custSel addSld modSld">
+      <pc:chgData name="Sean O Fithcheallaigh" userId="47659c31-a575-4792-8be3-61268c4ee0d6" providerId="ADAL" clId="{CA64B30F-511C-45F5-B991-1BF90300E7E0}" dt="2024-02-05T19:51:45.846" v="230" actId="1076"/>
+      <pc:docMkLst>
+        <pc:docMk/>
+      </pc:docMkLst>
+      <pc:sldChg chg="addSp delSp modSp new mod">
+        <pc:chgData name="Sean O Fithcheallaigh" userId="47659c31-a575-4792-8be3-61268c4ee0d6" providerId="ADAL" clId="{CA64B30F-511C-45F5-B991-1BF90300E7E0}" dt="2024-02-05T19:51:45.846" v="230" actId="1076"/>
+        <pc:sldMkLst>
+          <pc:docMk/>
+          <pc:sldMk cId="3874078205" sldId="258"/>
+        </pc:sldMkLst>
+        <pc:spChg chg="mod">
+          <ac:chgData name="Sean O Fithcheallaigh" userId="47659c31-a575-4792-8be3-61268c4ee0d6" providerId="ADAL" clId="{CA64B30F-511C-45F5-B991-1BF90300E7E0}" dt="2024-02-05T19:27:23.127" v="26" actId="20577"/>
+          <ac:spMkLst>
+            <pc:docMk/>
+            <pc:sldMk cId="3874078205" sldId="258"/>
+            <ac:spMk id="2" creationId="{781896B6-E7E5-4F41-B664-DC12C7499495}"/>
+          </ac:spMkLst>
+        </pc:spChg>
+        <pc:spChg chg="mod">
+          <ac:chgData name="Sean O Fithcheallaigh" userId="47659c31-a575-4792-8be3-61268c4ee0d6" providerId="ADAL" clId="{CA64B30F-511C-45F5-B991-1BF90300E7E0}" dt="2024-02-05T19:50:23.273" v="216" actId="20577"/>
+          <ac:spMkLst>
+            <pc:docMk/>
+            <pc:sldMk cId="3874078205" sldId="258"/>
+            <ac:spMk id="3" creationId="{F3BFD49E-147C-48F2-94FE-B635D761F52A}"/>
+          </ac:spMkLst>
+        </pc:spChg>
+        <pc:spChg chg="add del mod">
+          <ac:chgData name="Sean O Fithcheallaigh" userId="47659c31-a575-4792-8be3-61268c4ee0d6" providerId="ADAL" clId="{CA64B30F-511C-45F5-B991-1BF90300E7E0}" dt="2024-02-05T19:50:37.861" v="220"/>
+          <ac:spMkLst>
+            <pc:docMk/>
+            <pc:sldMk cId="3874078205" sldId="258"/>
+            <ac:spMk id="4" creationId="{0B2E7288-4B36-4D82-906C-029565AA1F25}"/>
+          </ac:spMkLst>
+        </pc:spChg>
+        <pc:spChg chg="add mod">
+          <ac:chgData name="Sean O Fithcheallaigh" userId="47659c31-a575-4792-8be3-61268c4ee0d6" providerId="ADAL" clId="{CA64B30F-511C-45F5-B991-1BF90300E7E0}" dt="2024-02-05T19:51:45.846" v="230" actId="1076"/>
+          <ac:spMkLst>
+            <pc:docMk/>
+            <pc:sldMk cId="3874078205" sldId="258"/>
+            <ac:spMk id="5" creationId="{FB4FD9FC-751B-4BD0-BE9C-133545251952}"/>
+          </ac:spMkLst>
+        </pc:spChg>
+      </pc:sldChg>
+    </pc:docChg>
+  </pc:docChgLst>
   <pc:docChgLst>
     <pc:chgData name="Sean" userId="47659c31-a575-4792-8be3-61268c4ee0d6" providerId="ADAL" clId="{CA64B30F-511C-45F5-B991-1BF90300E7E0}"/>
     <pc:docChg chg="custSel addSld modSld">
@@ -322,7 +379,7 @@
           <a:p>
             <a:fld id="{0CD94E99-FA29-4EFF-88BE-3447E30E8C4D}" type="datetimeFigureOut">
               <a:rPr lang="en-GB" smtClean="0"/>
-              <a:t>03/02/2024</a:t>
+              <a:t>05/02/2024</a:t>
             </a:fld>
             <a:endParaRPr lang="en-GB"/>
           </a:p>
@@ -522,7 +579,7 @@
           <a:p>
             <a:fld id="{0CD94E99-FA29-4EFF-88BE-3447E30E8C4D}" type="datetimeFigureOut">
               <a:rPr lang="en-GB" smtClean="0"/>
-              <a:t>03/02/2024</a:t>
+              <a:t>05/02/2024</a:t>
             </a:fld>
             <a:endParaRPr lang="en-GB"/>
           </a:p>
@@ -732,7 +789,7 @@
           <a:p>
             <a:fld id="{0CD94E99-FA29-4EFF-88BE-3447E30E8C4D}" type="datetimeFigureOut">
               <a:rPr lang="en-GB" smtClean="0"/>
-              <a:t>03/02/2024</a:t>
+              <a:t>05/02/2024</a:t>
             </a:fld>
             <a:endParaRPr lang="en-GB"/>
           </a:p>
@@ -932,7 +989,7 @@
           <a:p>
             <a:fld id="{0CD94E99-FA29-4EFF-88BE-3447E30E8C4D}" type="datetimeFigureOut">
               <a:rPr lang="en-GB" smtClean="0"/>
-              <a:t>03/02/2024</a:t>
+              <a:t>05/02/2024</a:t>
             </a:fld>
             <a:endParaRPr lang="en-GB"/>
           </a:p>
@@ -1208,7 +1265,7 @@
           <a:p>
             <a:fld id="{0CD94E99-FA29-4EFF-88BE-3447E30E8C4D}" type="datetimeFigureOut">
               <a:rPr lang="en-GB" smtClean="0"/>
-              <a:t>03/02/2024</a:t>
+              <a:t>05/02/2024</a:t>
             </a:fld>
             <a:endParaRPr lang="en-GB"/>
           </a:p>
@@ -1476,7 +1533,7 @@
           <a:p>
             <a:fld id="{0CD94E99-FA29-4EFF-88BE-3447E30E8C4D}" type="datetimeFigureOut">
               <a:rPr lang="en-GB" smtClean="0"/>
-              <a:t>03/02/2024</a:t>
+              <a:t>05/02/2024</a:t>
             </a:fld>
             <a:endParaRPr lang="en-GB"/>
           </a:p>
@@ -1891,7 +1948,7 @@
           <a:p>
             <a:fld id="{0CD94E99-FA29-4EFF-88BE-3447E30E8C4D}" type="datetimeFigureOut">
               <a:rPr lang="en-GB" smtClean="0"/>
-              <a:t>03/02/2024</a:t>
+              <a:t>05/02/2024</a:t>
             </a:fld>
             <a:endParaRPr lang="en-GB"/>
           </a:p>
@@ -2033,7 +2090,7 @@
           <a:p>
             <a:fld id="{0CD94E99-FA29-4EFF-88BE-3447E30E8C4D}" type="datetimeFigureOut">
               <a:rPr lang="en-GB" smtClean="0"/>
-              <a:t>03/02/2024</a:t>
+              <a:t>05/02/2024</a:t>
             </a:fld>
             <a:endParaRPr lang="en-GB"/>
           </a:p>
@@ -2146,7 +2203,7 @@
           <a:p>
             <a:fld id="{0CD94E99-FA29-4EFF-88BE-3447E30E8C4D}" type="datetimeFigureOut">
               <a:rPr lang="en-GB" smtClean="0"/>
-              <a:t>03/02/2024</a:t>
+              <a:t>05/02/2024</a:t>
             </a:fld>
             <a:endParaRPr lang="en-GB"/>
           </a:p>
@@ -2459,7 +2516,7 @@
           <a:p>
             <a:fld id="{0CD94E99-FA29-4EFF-88BE-3447E30E8C4D}" type="datetimeFigureOut">
               <a:rPr lang="en-GB" smtClean="0"/>
-              <a:t>03/02/2024</a:t>
+              <a:t>05/02/2024</a:t>
             </a:fld>
             <a:endParaRPr lang="en-GB"/>
           </a:p>
@@ -2748,7 +2805,7 @@
           <a:p>
             <a:fld id="{0CD94E99-FA29-4EFF-88BE-3447E30E8C4D}" type="datetimeFigureOut">
               <a:rPr lang="en-GB" smtClean="0"/>
-              <a:t>03/02/2024</a:t>
+              <a:t>05/02/2024</a:t>
             </a:fld>
             <a:endParaRPr lang="en-GB"/>
           </a:p>
@@ -2991,7 +3048,7 @@
           <a:p>
             <a:fld id="{0CD94E99-FA29-4EFF-88BE-3447E30E8C4D}" type="datetimeFigureOut">
               <a:rPr lang="en-GB" smtClean="0"/>
-              <a:t>03/02/2024</a:t>
+              <a:t>05/02/2024</a:t>
             </a:fld>
             <a:endParaRPr lang="en-GB"/>
           </a:p>
@@ -3584,6 +3641,155 @@
 </p:sld>
 </file>
 
+<file path=ppt/slides/slide3.xml><?xml version="1.0" encoding="utf-8"?>
+<p:sld xmlns:a="http://schemas.openxmlformats.org/drawingml/2006/main" xmlns:r="http://schemas.openxmlformats.org/officeDocument/2006/relationships" xmlns:p="http://schemas.openxmlformats.org/presentationml/2006/main">
+  <p:cSld>
+    <p:spTree>
+      <p:nvGrpSpPr>
+        <p:cNvPr id="1" name=""/>
+        <p:cNvGrpSpPr/>
+        <p:nvPr/>
+      </p:nvGrpSpPr>
+      <p:grpSpPr>
+        <a:xfrm>
+          <a:off x="0" y="0"/>
+          <a:ext cx="0" cy="0"/>
+          <a:chOff x="0" y="0"/>
+          <a:chExt cx="0" cy="0"/>
+        </a:xfrm>
+      </p:grpSpPr>
+      <p:sp>
+        <p:nvSpPr>
+          <p:cNvPr id="2" name="Title 1">
+            <a:extLst>
+              <a:ext uri="{FF2B5EF4-FFF2-40B4-BE49-F238E27FC236}">
+                <a16:creationId xmlns:a16="http://schemas.microsoft.com/office/drawing/2014/main" id="{781896B6-E7E5-4F41-B664-DC12C7499495}"/>
+              </a:ext>
+            </a:extLst>
+          </p:cNvPr>
+          <p:cNvSpPr>
+            <a:spLocks noGrp="1"/>
+          </p:cNvSpPr>
+          <p:nvPr>
+            <p:ph type="title"/>
+          </p:nvPr>
+        </p:nvSpPr>
+        <p:spPr/>
+        <p:txBody>
+          <a:bodyPr/>
+          <a:lstStyle/>
+          <a:p>
+            <a:r>
+              <a:rPr lang="en-US" dirty="0"/>
+              <a:t>Research Proposal Review</a:t>
+            </a:r>
+            <a:endParaRPr lang="en-GB" dirty="0"/>
+          </a:p>
+        </p:txBody>
+      </p:sp>
+      <p:sp>
+        <p:nvSpPr>
+          <p:cNvPr id="3" name="Content Placeholder 2">
+            <a:extLst>
+              <a:ext uri="{FF2B5EF4-FFF2-40B4-BE49-F238E27FC236}">
+                <a16:creationId xmlns:a16="http://schemas.microsoft.com/office/drawing/2014/main" id="{F3BFD49E-147C-48F2-94FE-B635D761F52A}"/>
+              </a:ext>
+            </a:extLst>
+          </p:cNvPr>
+          <p:cNvSpPr>
+            <a:spLocks noGrp="1"/>
+          </p:cNvSpPr>
+          <p:nvPr>
+            <p:ph idx="1"/>
+          </p:nvPr>
+        </p:nvSpPr>
+        <p:spPr/>
+        <p:txBody>
+          <a:bodyPr/>
+          <a:lstStyle/>
+          <a:p>
+            <a:r>
+              <a:rPr lang="en-US" dirty="0"/>
+              <a:t>Since the introduction of the IoT, we live in a world where sensors have become common place, and the of devices are projected to nearly double from today’s levels [1] </a:t>
+            </a:r>
+          </a:p>
+          <a:p>
+            <a:endParaRPr lang="en-GB" dirty="0"/>
+          </a:p>
+        </p:txBody>
+      </p:sp>
+      <p:sp>
+        <p:nvSpPr>
+          <p:cNvPr id="5" name="TextBox 4">
+            <a:extLst>
+              <a:ext uri="{FF2B5EF4-FFF2-40B4-BE49-F238E27FC236}">
+                <a16:creationId xmlns:a16="http://schemas.microsoft.com/office/drawing/2014/main" id="{FB4FD9FC-751B-4BD0-BE9C-133545251952}"/>
+              </a:ext>
+            </a:extLst>
+          </p:cNvPr>
+          <p:cNvSpPr txBox="1"/>
+          <p:nvPr/>
+        </p:nvSpPr>
+        <p:spPr>
+          <a:xfrm>
+            <a:off x="838200" y="5530632"/>
+            <a:ext cx="8630293" cy="646331"/>
+          </a:xfrm>
+          <a:prstGeom prst="rect">
+            <a:avLst/>
+          </a:prstGeom>
+          <a:noFill/>
+        </p:spPr>
+        <p:txBody>
+          <a:bodyPr wrap="square" rtlCol="0">
+            <a:spAutoFit/>
+          </a:bodyPr>
+          <a:lstStyle/>
+          <a:p>
+            <a:r>
+              <a:rPr lang="en-US" sz="1200" dirty="0">
+                <a:effectLst/>
+                <a:latin typeface="Calibri" panose="020F0502020204030204" pitchFamily="34" charset="0"/>
+                <a:ea typeface="Calibri" panose="020F0502020204030204" pitchFamily="34" charset="0"/>
+                <a:cs typeface="Times New Roman" panose="02020603050405020304" pitchFamily="18" charset="0"/>
+              </a:rPr>
+              <a:t>[1] L. Sujay </a:t>
+            </a:r>
+            <a:r>
+              <a:rPr lang="en-US" sz="1200" dirty="0" err="1">
+                <a:effectLst/>
+                <a:latin typeface="Calibri" panose="020F0502020204030204" pitchFamily="34" charset="0"/>
+                <a:ea typeface="Calibri" panose="020F0502020204030204" pitchFamily="34" charset="0"/>
+                <a:cs typeface="Times New Roman" panose="02020603050405020304" pitchFamily="18" charset="0"/>
+              </a:rPr>
+              <a:t>Vailshery</a:t>
+            </a:r>
+            <a:r>
+              <a:rPr lang="en-US" sz="1200" dirty="0">
+                <a:effectLst/>
+                <a:latin typeface="Calibri" panose="020F0502020204030204" pitchFamily="34" charset="0"/>
+                <a:ea typeface="Calibri" panose="020F0502020204030204" pitchFamily="34" charset="0"/>
+                <a:cs typeface="Times New Roman" panose="02020603050405020304" pitchFamily="18" charset="0"/>
+              </a:rPr>
+              <a:t>, "Number of Internet of Things (IoT) connected devices worldwide from 2019 to 2023, with forecasts from 2022 to 2030," Statista, July 2023. [Online]. Available: https://www.statista.com/statistics/1183457/iot-connected-devices-worldwide/. [Accessed 23 11 2].</a:t>
+            </a:r>
+            <a:endParaRPr lang="en-GB" sz="1200" dirty="0"/>
+          </a:p>
+        </p:txBody>
+      </p:sp>
+    </p:spTree>
+    <p:extLst>
+      <p:ext uri="{BB962C8B-B14F-4D97-AF65-F5344CB8AC3E}">
+        <p14:creationId xmlns:p14="http://schemas.microsoft.com/office/powerpoint/2010/main" val="3874078205"/>
+      </p:ext>
+    </p:extLst>
+  </p:cSld>
+  <p:clrMapOvr>
+    <a:masterClrMapping/>
+  </p:clrMapOvr>
+</p:sld>
+</file>
+
 <file path=ppt/theme/theme1.xml><?xml version="1.0" encoding="utf-8"?>
 <a:theme xmlns:a="http://schemas.openxmlformats.org/drawingml/2006/main" name="Office Theme">
   <a:themeElements>

</xml_diff>

<commit_message>
changed the format of the slides (i.e. theme)
</commit_message>
<xml_diff>
--- a/Presentations/Supervisor Meetings/2024/20240209.pptx
+++ b/Presentations/Supervisor Meetings/2024/20240209.pptx
@@ -2,7 +2,7 @@
 <file path=ppt/presentation.xml><?xml version="1.0" encoding="utf-8"?>
 <p:presentation xmlns:a="http://schemas.openxmlformats.org/drawingml/2006/main" xmlns:r="http://schemas.openxmlformats.org/officeDocument/2006/relationships" xmlns:p="http://schemas.openxmlformats.org/presentationml/2006/main" saveSubsetFonts="1">
   <p:sldMasterIdLst>
-    <p:sldMasterId id="2147483756" r:id="rId1"/>
+    <p:sldMasterId id="2147483884" r:id="rId1"/>
   </p:sldMasterIdLst>
   <p:sldIdLst>
     <p:sldId id="256" r:id="rId2"/>
@@ -119,7 +119,7 @@
 <file path=ppt/revisionInfo.xml><?xml version="1.0" encoding="utf-8"?>
 <p1510:revInfo xmlns:a="http://schemas.openxmlformats.org/drawingml/2006/main" xmlns:r="http://schemas.openxmlformats.org/officeDocument/2006/relationships" xmlns:p1510="http://schemas.microsoft.com/office/powerpoint/2015/10/main">
   <p1510:revLst>
-    <p1510:client id="{CA64B30F-511C-45F5-B991-1BF90300E7E0}" v="71" dt="2024-02-07T16:36:06.983"/>
+    <p1510:client id="{CA64B30F-511C-45F5-B991-1BF90300E7E0}" v="82" dt="2024-02-08T19:50:07.829"/>
   </p1510:revLst>
 </p1510:revInfo>
 </file>
@@ -129,7 +129,7 @@
   <pc:docChgLst>
     <pc:chgData name="Sean O Fithcheallaigh" userId="47659c31-a575-4792-8be3-61268c4ee0d6" providerId="ADAL" clId="{CA64B30F-511C-45F5-B991-1BF90300E7E0}"/>
     <pc:docChg chg="undo custSel mod addSld delSld modSld">
-      <pc:chgData name="Sean O Fithcheallaigh" userId="47659c31-a575-4792-8be3-61268c4ee0d6" providerId="ADAL" clId="{CA64B30F-511C-45F5-B991-1BF90300E7E0}" dt="2024-02-07T16:35:59.230" v="3628"/>
+      <pc:chgData name="Sean O Fithcheallaigh" userId="47659c31-a575-4792-8be3-61268c4ee0d6" providerId="ADAL" clId="{CA64B30F-511C-45F5-B991-1BF90300E7E0}" dt="2024-02-08T19:53:59.945" v="3716" actId="20577"/>
       <pc:docMkLst>
         <pc:docMk/>
       </pc:docMkLst>
@@ -413,13 +413,13 @@
         </pc:picChg>
       </pc:sldChg>
       <pc:sldChg chg="addSp delSp modSp mod setBg delDesignElem">
-        <pc:chgData name="Sean O Fithcheallaigh" userId="47659c31-a575-4792-8be3-61268c4ee0d6" providerId="ADAL" clId="{CA64B30F-511C-45F5-B991-1BF90300E7E0}" dt="2024-02-07T16:24:58.287" v="3367"/>
+        <pc:chgData name="Sean O Fithcheallaigh" userId="47659c31-a575-4792-8be3-61268c4ee0d6" providerId="ADAL" clId="{CA64B30F-511C-45F5-B991-1BF90300E7E0}" dt="2024-02-08T19:49:37.778" v="3652" actId="26606"/>
         <pc:sldMkLst>
           <pc:docMk/>
           <pc:sldMk cId="3126834720" sldId="257"/>
         </pc:sldMkLst>
         <pc:spChg chg="mod">
-          <ac:chgData name="Sean O Fithcheallaigh" userId="47659c31-a575-4792-8be3-61268c4ee0d6" providerId="ADAL" clId="{CA64B30F-511C-45F5-B991-1BF90300E7E0}" dt="2024-02-07T16:24:47.747" v="3365" actId="26606"/>
+          <ac:chgData name="Sean O Fithcheallaigh" userId="47659c31-a575-4792-8be3-61268c4ee0d6" providerId="ADAL" clId="{CA64B30F-511C-45F5-B991-1BF90300E7E0}" dt="2024-02-08T19:49:37.778" v="3652" actId="26606"/>
           <ac:spMkLst>
             <pc:docMk/>
             <pc:sldMk cId="3126834720" sldId="257"/>
@@ -555,7 +555,7 @@
           </ac:graphicFrameMkLst>
         </pc:graphicFrameChg>
         <pc:graphicFrameChg chg="add mod modGraphic">
-          <ac:chgData name="Sean O Fithcheallaigh" userId="47659c31-a575-4792-8be3-61268c4ee0d6" providerId="ADAL" clId="{CA64B30F-511C-45F5-B991-1BF90300E7E0}" dt="2024-02-07T16:24:47.747" v="3365" actId="26606"/>
+          <ac:chgData name="Sean O Fithcheallaigh" userId="47659c31-a575-4792-8be3-61268c4ee0d6" providerId="ADAL" clId="{CA64B30F-511C-45F5-B991-1BF90300E7E0}" dt="2024-02-08T19:49:37.778" v="3652" actId="26606"/>
           <ac:graphicFrameMkLst>
             <pc:docMk/>
             <pc:sldMk cId="3126834720" sldId="257"/>
@@ -564,13 +564,13 @@
         </pc:graphicFrameChg>
       </pc:sldChg>
       <pc:sldChg chg="addSp delSp modSp new mod setBg delDesignElem">
-        <pc:chgData name="Sean O Fithcheallaigh" userId="47659c31-a575-4792-8be3-61268c4ee0d6" providerId="ADAL" clId="{CA64B30F-511C-45F5-B991-1BF90300E7E0}" dt="2024-02-07T16:25:38.534" v="3384" actId="313"/>
+        <pc:chgData name="Sean O Fithcheallaigh" userId="47659c31-a575-4792-8be3-61268c4ee0d6" providerId="ADAL" clId="{CA64B30F-511C-45F5-B991-1BF90300E7E0}" dt="2024-02-08T19:49:29.959" v="3650" actId="27636"/>
         <pc:sldMkLst>
           <pc:docMk/>
           <pc:sldMk cId="3874078205" sldId="258"/>
         </pc:sldMkLst>
         <pc:spChg chg="mod">
-          <ac:chgData name="Sean O Fithcheallaigh" userId="47659c31-a575-4792-8be3-61268c4ee0d6" providerId="ADAL" clId="{CA64B30F-511C-45F5-B991-1BF90300E7E0}" dt="2024-02-07T16:25:38.534" v="3384" actId="313"/>
+          <ac:chgData name="Sean O Fithcheallaigh" userId="47659c31-a575-4792-8be3-61268c4ee0d6" providerId="ADAL" clId="{CA64B30F-511C-45F5-B991-1BF90300E7E0}" dt="2024-02-08T19:49:29.959" v="3650" actId="27636"/>
           <ac:spMkLst>
             <pc:docMk/>
             <pc:sldMk cId="3874078205" sldId="258"/>
@@ -739,7 +739,7 @@
         </pc:graphicFrameChg>
       </pc:sldChg>
       <pc:sldChg chg="addSp delSp modSp add mod setBg delDesignElem">
-        <pc:chgData name="Sean O Fithcheallaigh" userId="47659c31-a575-4792-8be3-61268c4ee0d6" providerId="ADAL" clId="{CA64B30F-511C-45F5-B991-1BF90300E7E0}" dt="2024-02-07T16:33:12.352" v="3614" actId="14100"/>
+        <pc:chgData name="Sean O Fithcheallaigh" userId="47659c31-a575-4792-8be3-61268c4ee0d6" providerId="ADAL" clId="{CA64B30F-511C-45F5-B991-1BF90300E7E0}" dt="2024-02-08T19:49:15.119" v="3648" actId="27636"/>
         <pc:sldMkLst>
           <pc:docMk/>
           <pc:sldMk cId="2143467693" sldId="259"/>
@@ -753,7 +753,7 @@
           </ac:spMkLst>
         </pc:spChg>
         <pc:spChg chg="mod ord">
-          <ac:chgData name="Sean O Fithcheallaigh" userId="47659c31-a575-4792-8be3-61268c4ee0d6" providerId="ADAL" clId="{CA64B30F-511C-45F5-B991-1BF90300E7E0}" dt="2024-02-07T16:31:00.357" v="3545" actId="14100"/>
+          <ac:chgData name="Sean O Fithcheallaigh" userId="47659c31-a575-4792-8be3-61268c4ee0d6" providerId="ADAL" clId="{CA64B30F-511C-45F5-B991-1BF90300E7E0}" dt="2024-02-08T19:47:17.733" v="3632" actId="14100"/>
           <ac:spMkLst>
             <pc:docMk/>
             <pc:sldMk cId="2143467693" sldId="259"/>
@@ -817,7 +817,7 @@
           </ac:spMkLst>
         </pc:spChg>
         <pc:spChg chg="add mod">
-          <ac:chgData name="Sean O Fithcheallaigh" userId="47659c31-a575-4792-8be3-61268c4ee0d6" providerId="ADAL" clId="{CA64B30F-511C-45F5-B991-1BF90300E7E0}" dt="2024-02-07T16:32:40.785" v="3579" actId="688"/>
+          <ac:chgData name="Sean O Fithcheallaigh" userId="47659c31-a575-4792-8be3-61268c4ee0d6" providerId="ADAL" clId="{CA64B30F-511C-45F5-B991-1BF90300E7E0}" dt="2024-02-08T19:49:06.451" v="3646" actId="27636"/>
           <ac:spMkLst>
             <pc:docMk/>
             <pc:sldMk cId="2143467693" sldId="259"/>
@@ -825,7 +825,7 @@
           </ac:spMkLst>
         </pc:spChg>
         <pc:spChg chg="add mod">
-          <ac:chgData name="Sean O Fithcheallaigh" userId="47659c31-a575-4792-8be3-61268c4ee0d6" providerId="ADAL" clId="{CA64B30F-511C-45F5-B991-1BF90300E7E0}" dt="2024-02-07T16:32:37.164" v="3578" actId="688"/>
+          <ac:chgData name="Sean O Fithcheallaigh" userId="47659c31-a575-4792-8be3-61268c4ee0d6" providerId="ADAL" clId="{CA64B30F-511C-45F5-B991-1BF90300E7E0}" dt="2024-02-08T19:49:15.119" v="3648" actId="27636"/>
           <ac:spMkLst>
             <pc:docMk/>
             <pc:sldMk cId="2143467693" sldId="259"/>
@@ -970,13 +970,13 @@
         </pc:cxnChg>
       </pc:sldChg>
       <pc:sldChg chg="addSp delSp modSp new mod setBg setClrOvrMap delDesignElem chgLayout">
-        <pc:chgData name="Sean O Fithcheallaigh" userId="47659c31-a575-4792-8be3-61268c4ee0d6" providerId="ADAL" clId="{CA64B30F-511C-45F5-B991-1BF90300E7E0}" dt="2024-02-07T16:35:59.230" v="3628"/>
+        <pc:chgData name="Sean O Fithcheallaigh" userId="47659c31-a575-4792-8be3-61268c4ee0d6" providerId="ADAL" clId="{CA64B30F-511C-45F5-B991-1BF90300E7E0}" dt="2024-02-08T19:53:59.945" v="3716" actId="20577"/>
         <pc:sldMkLst>
           <pc:docMk/>
           <pc:sldMk cId="164553243" sldId="260"/>
         </pc:sldMkLst>
         <pc:spChg chg="mod ord">
-          <ac:chgData name="Sean O Fithcheallaigh" userId="47659c31-a575-4792-8be3-61268c4ee0d6" providerId="ADAL" clId="{CA64B30F-511C-45F5-B991-1BF90300E7E0}" dt="2024-02-07T16:34:32.741" v="3615" actId="26606"/>
+          <ac:chgData name="Sean O Fithcheallaigh" userId="47659c31-a575-4792-8be3-61268c4ee0d6" providerId="ADAL" clId="{CA64B30F-511C-45F5-B991-1BF90300E7E0}" dt="2024-02-08T19:51:13.715" v="3661" actId="14100"/>
           <ac:spMkLst>
             <pc:docMk/>
             <pc:sldMk cId="164553243" sldId="260"/>
@@ -992,7 +992,7 @@
           </ac:spMkLst>
         </pc:spChg>
         <pc:spChg chg="add mod ord">
-          <ac:chgData name="Sean O Fithcheallaigh" userId="47659c31-a575-4792-8be3-61268c4ee0d6" providerId="ADAL" clId="{CA64B30F-511C-45F5-B991-1BF90300E7E0}" dt="2024-02-07T16:35:19.574" v="3624" actId="12"/>
+          <ac:chgData name="Sean O Fithcheallaigh" userId="47659c31-a575-4792-8be3-61268c4ee0d6" providerId="ADAL" clId="{CA64B30F-511C-45F5-B991-1BF90300E7E0}" dt="2024-02-08T19:50:50.229" v="3657" actId="1076"/>
           <ac:spMkLst>
             <pc:docMk/>
             <pc:sldMk cId="164553243" sldId="260"/>
@@ -1000,7 +1000,7 @@
           </ac:spMkLst>
         </pc:spChg>
         <pc:spChg chg="add mod ord">
-          <ac:chgData name="Sean O Fithcheallaigh" userId="47659c31-a575-4792-8be3-61268c4ee0d6" providerId="ADAL" clId="{CA64B30F-511C-45F5-B991-1BF90300E7E0}" dt="2024-02-07T16:35:25.856" v="3626" actId="15"/>
+          <ac:chgData name="Sean O Fithcheallaigh" userId="47659c31-a575-4792-8be3-61268c4ee0d6" providerId="ADAL" clId="{CA64B30F-511C-45F5-B991-1BF90300E7E0}" dt="2024-02-08T19:53:59.945" v="3716" actId="20577"/>
           <ac:spMkLst>
             <pc:docMk/>
             <pc:sldMk cId="164553243" sldId="260"/>
@@ -1311,6 +1311,37 @@
             <ac:cxnSpMk id="37" creationId="{D7A4964E-33C0-4563-92BB-988B2C925F92}"/>
           </ac:cxnSpMkLst>
         </pc:cxnChg>
+      </pc:sldChg>
+      <pc:sldChg chg="modSp new del">
+        <pc:chgData name="Sean O Fithcheallaigh" userId="47659c31-a575-4792-8be3-61268c4ee0d6" providerId="ADAL" clId="{CA64B30F-511C-45F5-B991-1BF90300E7E0}" dt="2024-02-08T19:53:05.311" v="3706" actId="47"/>
+        <pc:sldMkLst>
+          <pc:docMk/>
+          <pc:sldMk cId="831234913" sldId="261"/>
+        </pc:sldMkLst>
+        <pc:spChg chg="mod">
+          <ac:chgData name="Sean O Fithcheallaigh" userId="47659c31-a575-4792-8be3-61268c4ee0d6" providerId="ADAL" clId="{CA64B30F-511C-45F5-B991-1BF90300E7E0}" dt="2024-02-08T19:49:31.985" v="3651"/>
+          <ac:spMkLst>
+            <pc:docMk/>
+            <pc:sldMk cId="831234913" sldId="261"/>
+            <ac:spMk id="2" creationId="{6198B2FE-4E86-48F0-99F1-21FC1DEFD170}"/>
+          </ac:spMkLst>
+        </pc:spChg>
+        <pc:spChg chg="mod">
+          <ac:chgData name="Sean O Fithcheallaigh" userId="47659c31-a575-4792-8be3-61268c4ee0d6" providerId="ADAL" clId="{CA64B30F-511C-45F5-B991-1BF90300E7E0}" dt="2024-02-08T19:49:31.985" v="3651"/>
+          <ac:spMkLst>
+            <pc:docMk/>
+            <pc:sldMk cId="831234913" sldId="261"/>
+            <ac:spMk id="3" creationId="{6FC8404B-FA27-4FF3-9B26-08EFAFC11512}"/>
+          </ac:spMkLst>
+        </pc:spChg>
+        <pc:spChg chg="mod">
+          <ac:chgData name="Sean O Fithcheallaigh" userId="47659c31-a575-4792-8be3-61268c4ee0d6" providerId="ADAL" clId="{CA64B30F-511C-45F5-B991-1BF90300E7E0}" dt="2024-02-08T19:49:31.985" v="3651"/>
+          <ac:spMkLst>
+            <pc:docMk/>
+            <pc:sldMk cId="831234913" sldId="261"/>
+            <ac:spMk id="4" creationId="{E20C7088-1876-44F1-B757-FA014A841354}"/>
+          </ac:spMkLst>
+        </pc:spChg>
       </pc:sldChg>
       <pc:sldChg chg="new del">
         <pc:chgData name="Sean O Fithcheallaigh" userId="47659c31-a575-4792-8be3-61268c4ee0d6" providerId="ADAL" clId="{CA64B30F-511C-45F5-B991-1BF90300E7E0}" dt="2024-02-07T15:40:14.241" v="3227" actId="680"/>
@@ -1380,15 +1411,15 @@
 </file>
 
 <file path=ppt/diagrams/colors1.xml><?xml version="1.0" encoding="utf-8"?>
-<dgm:colorsDef xmlns:dgm="http://schemas.openxmlformats.org/drawingml/2006/diagram" xmlns:a="http://schemas.openxmlformats.org/drawingml/2006/main" uniqueId="urn:microsoft.com/office/officeart/2018/5/colors/Iconchunking_neutralicon_accent2_2">
+<dgm:colorsDef xmlns:dgm="http://schemas.openxmlformats.org/drawingml/2006/diagram" xmlns:a="http://schemas.openxmlformats.org/drawingml/2006/main" uniqueId="urn:microsoft.com/office/officeart/2018/5/colors/Iconchunking_neutralbg_colorful5">
   <dgm:title val=""/>
   <dgm:desc val=""/>
   <dgm:catLst>
-    <dgm:cat type="accent2" pri="11200"/>
+    <dgm:cat type="colorful" pri="10500"/>
   </dgm:catLst>
   <dgm:styleLbl name="node0">
     <dgm:fillClrLst meth="repeat">
-      <a:schemeClr val="accent2"/>
+      <a:schemeClr val="accent4"/>
     </dgm:fillClrLst>
     <dgm:linClrLst meth="repeat">
       <a:schemeClr val="lt1"/>
@@ -1399,8 +1430,9 @@
     <dgm:txEffectClrLst/>
   </dgm:styleLbl>
   <dgm:styleLbl name="node1">
-    <dgm:fillClrLst meth="repeat">
-      <a:schemeClr val="bg1"/>
+    <dgm:fillClrLst>
+      <a:schemeClr val="accent5"/>
+      <a:schemeClr val="accent6"/>
     </dgm:fillClrLst>
     <dgm:linClrLst meth="repeat">
       <a:schemeClr val="lt1">
@@ -1409,17 +1441,17 @@
     </dgm:linClrLst>
     <dgm:effectClrLst/>
     <dgm:txLinClrLst/>
-    <dgm:txFillClrLst meth="repeat">
-      <a:schemeClr val="dk1"/>
-    </dgm:txFillClrLst>
+    <dgm:txFillClrLst/>
     <dgm:txEffectClrLst/>
   </dgm:styleLbl>
   <dgm:styleLbl name="alignNode1">
-    <dgm:fillClrLst meth="repeat">
-      <a:schemeClr val="accent2"/>
+    <dgm:fillClrLst>
+      <a:schemeClr val="accent5"/>
+      <a:schemeClr val="accent6"/>
     </dgm:fillClrLst>
-    <dgm:linClrLst meth="repeat">
-      <a:schemeClr val="accent2"/>
+    <dgm:linClrLst>
+      <a:schemeClr val="accent5"/>
+      <a:schemeClr val="accent6"/>
     </dgm:linClrLst>
     <dgm:effectClrLst/>
     <dgm:txLinClrLst/>
@@ -1427,8 +1459,9 @@
     <dgm:txEffectClrLst/>
   </dgm:styleLbl>
   <dgm:styleLbl name="lnNode1">
-    <dgm:fillClrLst meth="repeat">
-      <a:schemeClr val="accent2"/>
+    <dgm:fillClrLst>
+      <a:schemeClr val="accent5"/>
+      <a:schemeClr val="accent6"/>
     </dgm:fillClrLst>
     <dgm:linClrLst meth="repeat">
       <a:schemeClr val="lt1"/>
@@ -1439,8 +1472,11 @@
     <dgm:txEffectClrLst/>
   </dgm:styleLbl>
   <dgm:styleLbl name="vennNode1">
-    <dgm:fillClrLst meth="repeat">
-      <a:schemeClr val="accent2">
+    <dgm:fillClrLst>
+      <a:schemeClr val="accent5">
+        <a:alpha val="50000"/>
+      </a:schemeClr>
+      <a:schemeClr val="accent6">
         <a:alpha val="50000"/>
       </a:schemeClr>
     </dgm:fillClrLst>
@@ -1453,8 +1489,8 @@
     <dgm:txEffectClrLst/>
   </dgm:styleLbl>
   <dgm:styleLbl name="node2">
-    <dgm:fillClrLst meth="repeat">
-      <a:schemeClr val="accent2"/>
+    <dgm:fillClrLst>
+      <a:schemeClr val="accent6"/>
     </dgm:fillClrLst>
     <dgm:linClrLst meth="repeat">
       <a:schemeClr val="lt1"/>
@@ -1465,8 +1501,8 @@
     <dgm:txEffectClrLst/>
   </dgm:styleLbl>
   <dgm:styleLbl name="node3">
-    <dgm:fillClrLst meth="repeat">
-      <a:schemeClr val="accent2"/>
+    <dgm:fillClrLst>
+      <a:schemeClr val="accent1"/>
     </dgm:fillClrLst>
     <dgm:linClrLst meth="repeat">
       <a:schemeClr val="lt1"/>
@@ -1477,7 +1513,7 @@
     <dgm:txEffectClrLst/>
   </dgm:styleLbl>
   <dgm:styleLbl name="node4">
-    <dgm:fillClrLst meth="repeat">
+    <dgm:fillClrLst>
       <a:schemeClr val="accent2"/>
     </dgm:fillClrLst>
     <dgm:linClrLst meth="repeat">
@@ -1489,8 +1525,11 @@
     <dgm:txEffectClrLst/>
   </dgm:styleLbl>
   <dgm:styleLbl name="fgImgPlace1">
-    <dgm:fillClrLst meth="repeat">
-      <a:schemeClr val="accent2">
+    <dgm:fillClrLst>
+      <a:schemeClr val="accent5">
+        <a:tint val="50000"/>
+      </a:schemeClr>
+      <a:schemeClr val="accent6">
         <a:tint val="50000"/>
       </a:schemeClr>
     </dgm:fillClrLst>
@@ -1505,9 +1544,12 @@
     <dgm:txEffectClrLst/>
   </dgm:styleLbl>
   <dgm:styleLbl name="alignImgPlace1">
-    <dgm:fillClrLst meth="repeat">
-      <a:schemeClr val="accent2">
+    <dgm:fillClrLst>
+      <a:schemeClr val="accent5">
         <a:tint val="50000"/>
+      </a:schemeClr>
+      <a:schemeClr val="accent6">
+        <a:tint val="20000"/>
       </a:schemeClr>
     </dgm:fillClrLst>
     <dgm:linClrLst meth="repeat">
@@ -1521,9 +1563,12 @@
     <dgm:txEffectClrLst/>
   </dgm:styleLbl>
   <dgm:styleLbl name="bgImgPlace1">
-    <dgm:fillClrLst meth="repeat">
-      <a:schemeClr val="accent2">
+    <dgm:fillClrLst>
+      <a:schemeClr val="accent5">
         <a:tint val="50000"/>
+      </a:schemeClr>
+      <a:schemeClr val="accent6">
+        <a:tint val="20000"/>
       </a:schemeClr>
     </dgm:fillClrLst>
     <dgm:linClrLst meth="repeat">
@@ -1537,15 +1582,12 @@
     <dgm:txEffectClrLst/>
   </dgm:styleLbl>
   <dgm:styleLbl name="sibTrans2D1">
-    <dgm:fillClrLst meth="repeat">
-      <a:schemeClr val="accent2">
-        <a:tint val="60000"/>
-      </a:schemeClr>
+    <dgm:fillClrLst>
+      <a:schemeClr val="accent5"/>
+      <a:schemeClr val="accent6"/>
     </dgm:fillClrLst>
     <dgm:linClrLst meth="repeat">
-      <a:schemeClr val="accent2">
-        <a:tint val="60000"/>
-      </a:schemeClr>
+      <a:schemeClr val="lt1"/>
     </dgm:linClrLst>
     <dgm:effectClrLst/>
     <dgm:txLinClrLst/>
@@ -1553,43 +1595,40 @@
     <dgm:txEffectClrLst/>
   </dgm:styleLbl>
   <dgm:styleLbl name="fgSibTrans2D1">
-    <dgm:fillClrLst meth="repeat">
-      <a:schemeClr val="accent2">
-        <a:tint val="60000"/>
-      </a:schemeClr>
+    <dgm:fillClrLst>
+      <a:schemeClr val="accent5"/>
+      <a:schemeClr val="accent6"/>
     </dgm:fillClrLst>
     <dgm:linClrLst meth="repeat">
-      <a:schemeClr val="accent2">
-        <a:tint val="60000"/>
-      </a:schemeClr>
+      <a:schemeClr val="lt1"/>
     </dgm:linClrLst>
     <dgm:effectClrLst/>
     <dgm:txLinClrLst/>
-    <dgm:txFillClrLst/>
+    <dgm:txFillClrLst meth="repeat">
+      <a:schemeClr val="lt1"/>
+    </dgm:txFillClrLst>
     <dgm:txEffectClrLst/>
   </dgm:styleLbl>
   <dgm:styleLbl name="bgSibTrans2D1">
-    <dgm:fillClrLst meth="repeat">
-      <a:schemeClr val="accent2">
-        <a:tint val="60000"/>
-      </a:schemeClr>
+    <dgm:fillClrLst>
+      <a:schemeClr val="accent5"/>
+      <a:schemeClr val="accent6"/>
     </dgm:fillClrLst>
     <dgm:linClrLst meth="repeat">
-      <a:schemeClr val="accent2">
-        <a:tint val="60000"/>
-      </a:schemeClr>
+      <a:schemeClr val="lt1"/>
     </dgm:linClrLst>
     <dgm:effectClrLst/>
     <dgm:txLinClrLst/>
-    <dgm:txFillClrLst/>
+    <dgm:txFillClrLst meth="repeat">
+      <a:schemeClr val="lt1"/>
+    </dgm:txFillClrLst>
     <dgm:txEffectClrLst/>
   </dgm:styleLbl>
   <dgm:styleLbl name="sibTrans1D1">
-    <dgm:fillClrLst meth="repeat">
-      <a:schemeClr val="accent2"/>
-    </dgm:fillClrLst>
-    <dgm:linClrLst meth="repeat">
-      <a:schemeClr val="accent2"/>
+    <dgm:fillClrLst/>
+    <dgm:linClrLst>
+      <a:schemeClr val="accent5"/>
+      <a:schemeClr val="accent6"/>
     </dgm:linClrLst>
     <dgm:effectClrLst/>
     <dgm:txLinClrLst/>
@@ -1600,10 +1639,10 @@
   </dgm:styleLbl>
   <dgm:styleLbl name="callout">
     <dgm:fillClrLst meth="repeat">
-      <a:schemeClr val="accent2"/>
+      <a:schemeClr val="accent5"/>
     </dgm:fillClrLst>
     <dgm:linClrLst meth="repeat">
-      <a:schemeClr val="accent2">
+      <a:schemeClr val="accent5">
         <a:tint val="50000"/>
       </a:schemeClr>
     </dgm:linClrLst>
@@ -1616,10 +1655,12 @@
   </dgm:styleLbl>
   <dgm:styleLbl name="asst0">
     <dgm:fillClrLst meth="repeat">
-      <a:schemeClr val="accent2"/>
+      <a:schemeClr val="accent5"/>
     </dgm:fillClrLst>
     <dgm:linClrLst meth="repeat">
-      <a:schemeClr val="lt1"/>
+      <a:schemeClr val="lt1">
+        <a:shade val="80000"/>
+      </a:schemeClr>
     </dgm:linClrLst>
     <dgm:effectClrLst/>
     <dgm:txLinClrLst/>
@@ -1628,10 +1669,12 @@
   </dgm:styleLbl>
   <dgm:styleLbl name="asst1">
     <dgm:fillClrLst meth="repeat">
-      <a:schemeClr val="accent2"/>
+      <a:schemeClr val="accent6"/>
     </dgm:fillClrLst>
     <dgm:linClrLst meth="repeat">
-      <a:schemeClr val="lt1"/>
+      <a:schemeClr val="lt1">
+        <a:shade val="80000"/>
+      </a:schemeClr>
     </dgm:linClrLst>
     <dgm:effectClrLst/>
     <dgm:txLinClrLst/>
@@ -1639,8 +1682,8 @@
     <dgm:txEffectClrLst/>
   </dgm:styleLbl>
   <dgm:styleLbl name="asst2">
-    <dgm:fillClrLst meth="repeat">
-      <a:schemeClr val="accent2"/>
+    <dgm:fillClrLst>
+      <a:schemeClr val="accent1"/>
     </dgm:fillClrLst>
     <dgm:linClrLst meth="repeat">
       <a:schemeClr val="lt1"/>
@@ -1651,7 +1694,7 @@
     <dgm:txEffectClrLst/>
   </dgm:styleLbl>
   <dgm:styleLbl name="asst3">
-    <dgm:fillClrLst meth="repeat">
+    <dgm:fillClrLst>
       <a:schemeClr val="accent2"/>
     </dgm:fillClrLst>
     <dgm:linClrLst meth="repeat">
@@ -1663,8 +1706,8 @@
     <dgm:txEffectClrLst/>
   </dgm:styleLbl>
   <dgm:styleLbl name="asst4">
-    <dgm:fillClrLst meth="repeat">
-      <a:schemeClr val="accent2"/>
+    <dgm:fillClrLst>
+      <a:schemeClr val="accent3"/>
     </dgm:fillClrLst>
     <dgm:linClrLst meth="repeat">
       <a:schemeClr val="lt1"/>
@@ -1676,14 +1719,10 @@
   </dgm:styleLbl>
   <dgm:styleLbl name="parChTrans2D1">
     <dgm:fillClrLst meth="repeat">
-      <a:schemeClr val="accent2">
-        <a:tint val="60000"/>
-      </a:schemeClr>
+      <a:schemeClr val="accent5"/>
     </dgm:fillClrLst>
     <dgm:linClrLst meth="repeat">
-      <a:schemeClr val="accent2">
-        <a:tint val="60000"/>
-      </a:schemeClr>
+      <a:schemeClr val="lt1"/>
     </dgm:linClrLst>
     <dgm:effectClrLst/>
     <dgm:txLinClrLst/>
@@ -1694,38 +1733,34 @@
   </dgm:styleLbl>
   <dgm:styleLbl name="parChTrans2D2">
     <dgm:fillClrLst meth="repeat">
-      <a:schemeClr val="accent2"/>
+      <a:schemeClr val="accent6"/>
     </dgm:fillClrLst>
     <dgm:linClrLst meth="repeat">
-      <a:schemeClr val="accent2"/>
+      <a:schemeClr val="lt1"/>
     </dgm:linClrLst>
     <dgm:effectClrLst/>
     <dgm:txLinClrLst/>
-    <dgm:txFillClrLst meth="repeat">
-      <a:schemeClr val="lt1"/>
-    </dgm:txFillClrLst>
+    <dgm:txFillClrLst/>
     <dgm:txEffectClrLst/>
   </dgm:styleLbl>
   <dgm:styleLbl name="parChTrans2D3">
     <dgm:fillClrLst meth="repeat">
-      <a:schemeClr val="accent2"/>
+      <a:schemeClr val="accent6"/>
     </dgm:fillClrLst>
     <dgm:linClrLst meth="repeat">
-      <a:schemeClr val="accent2"/>
+      <a:schemeClr val="lt1"/>
     </dgm:linClrLst>
     <dgm:effectClrLst/>
     <dgm:txLinClrLst/>
-    <dgm:txFillClrLst meth="repeat">
-      <a:schemeClr val="lt1"/>
-    </dgm:txFillClrLst>
+    <dgm:txFillClrLst/>
     <dgm:txEffectClrLst/>
   </dgm:styleLbl>
   <dgm:styleLbl name="parChTrans2D4">
     <dgm:fillClrLst meth="repeat">
-      <a:schemeClr val="accent2"/>
+      <a:schemeClr val="accent1"/>
     </dgm:fillClrLst>
     <dgm:linClrLst meth="repeat">
-      <a:schemeClr val="accent2"/>
+      <a:schemeClr val="lt1"/>
     </dgm:linClrLst>
     <dgm:effectClrLst/>
     <dgm:txLinClrLst/>
@@ -1736,12 +1771,10 @@
   </dgm:styleLbl>
   <dgm:styleLbl name="parChTrans1D1">
     <dgm:fillClrLst meth="repeat">
-      <a:schemeClr val="accent2"/>
+      <a:schemeClr val="accent5"/>
     </dgm:fillClrLst>
     <dgm:linClrLst meth="repeat">
-      <a:schemeClr val="accent2">
-        <a:shade val="60000"/>
-      </a:schemeClr>
+      <a:schemeClr val="accent5"/>
     </dgm:linClrLst>
     <dgm:effectClrLst/>
     <dgm:txLinClrLst/>
@@ -1752,12 +1785,12 @@
   </dgm:styleLbl>
   <dgm:styleLbl name="parChTrans1D2">
     <dgm:fillClrLst meth="repeat">
-      <a:schemeClr val="accent2"/>
+      <a:schemeClr val="accent6">
+        <a:tint val="90000"/>
+      </a:schemeClr>
     </dgm:fillClrLst>
     <dgm:linClrLst meth="repeat">
-      <a:schemeClr val="accent2">
-        <a:shade val="60000"/>
-      </a:schemeClr>
+      <a:schemeClr val="accent6"/>
     </dgm:linClrLst>
     <dgm:effectClrLst/>
     <dgm:txLinClrLst/>
@@ -1768,12 +1801,12 @@
   </dgm:styleLbl>
   <dgm:styleLbl name="parChTrans1D3">
     <dgm:fillClrLst meth="repeat">
-      <a:schemeClr val="accent2"/>
+      <a:schemeClr val="accent6">
+        <a:tint val="70000"/>
+      </a:schemeClr>
     </dgm:fillClrLst>
     <dgm:linClrLst meth="repeat">
-      <a:schemeClr val="accent2">
-        <a:shade val="80000"/>
-      </a:schemeClr>
+      <a:schemeClr val="accent1"/>
     </dgm:linClrLst>
     <dgm:effectClrLst/>
     <dgm:txLinClrLst/>
@@ -1784,12 +1817,12 @@
   </dgm:styleLbl>
   <dgm:styleLbl name="parChTrans1D4">
     <dgm:fillClrLst meth="repeat">
-      <a:schemeClr val="accent2"/>
+      <a:schemeClr val="accent6">
+        <a:tint val="50000"/>
+      </a:schemeClr>
     </dgm:fillClrLst>
     <dgm:linClrLst meth="repeat">
-      <a:schemeClr val="accent2">
-        <a:shade val="80000"/>
-      </a:schemeClr>
+      <a:schemeClr val="accent2"/>
     </dgm:linClrLst>
     <dgm:effectClrLst/>
     <dgm:txLinClrLst/>
@@ -1804,8 +1837,9 @@
         <a:alpha val="90000"/>
       </a:schemeClr>
     </dgm:fillClrLst>
-    <dgm:linClrLst meth="repeat">
-      <a:schemeClr val="accent2"/>
+    <dgm:linClrLst>
+      <a:schemeClr val="accent5"/>
+      <a:schemeClr val="accent6"/>
     </dgm:linClrLst>
     <dgm:effectClrLst/>
     <dgm:txLinClrLst/>
@@ -1820,8 +1854,9 @@
         <a:alpha val="90000"/>
       </a:schemeClr>
     </dgm:fillClrLst>
-    <dgm:linClrLst meth="repeat">
-      <a:schemeClr val="accent2"/>
+    <dgm:linClrLst>
+      <a:schemeClr val="accent5"/>
+      <a:schemeClr val="accent6"/>
     </dgm:linClrLst>
     <dgm:effectClrLst/>
     <dgm:txLinClrLst/>
@@ -1836,8 +1871,9 @@
         <a:alpha val="90000"/>
       </a:schemeClr>
     </dgm:fillClrLst>
-    <dgm:linClrLst meth="repeat">
-      <a:schemeClr val="accent2"/>
+    <dgm:linClrLst>
+      <a:schemeClr val="accent5"/>
+      <a:schemeClr val="accent6"/>
     </dgm:linClrLst>
     <dgm:effectClrLst/>
     <dgm:txLinClrLst/>
@@ -1853,7 +1889,7 @@
       </a:schemeClr>
     </dgm:fillClrLst>
     <dgm:linClrLst meth="repeat">
-      <a:schemeClr val="accent2"/>
+      <a:schemeClr val="accent5"/>
     </dgm:linClrLst>
     <dgm:effectClrLst/>
     <dgm:txLinClrLst/>
@@ -1868,8 +1904,9 @@
         <a:alpha val="90000"/>
       </a:schemeClr>
     </dgm:fillClrLst>
-    <dgm:linClrLst meth="repeat">
-      <a:schemeClr val="accent2"/>
+    <dgm:linClrLst>
+      <a:schemeClr val="accent5"/>
+      <a:schemeClr val="accent6"/>
     </dgm:linClrLst>
     <dgm:effectClrLst/>
     <dgm:txLinClrLst/>
@@ -1882,8 +1919,9 @@
     <dgm:fillClrLst meth="repeat">
       <a:schemeClr val="lt1"/>
     </dgm:fillClrLst>
-    <dgm:linClrLst meth="repeat">
-      <a:schemeClr val="accent2"/>
+    <dgm:linClrLst>
+      <a:schemeClr val="accent5"/>
+      <a:schemeClr val="accent6"/>
     </dgm:linClrLst>
     <dgm:effectClrLst/>
     <dgm:txLinClrLst/>
@@ -1896,8 +1934,9 @@
     <dgm:fillClrLst meth="repeat">
       <a:schemeClr val="lt1"/>
     </dgm:fillClrLst>
-    <dgm:linClrLst meth="repeat">
-      <a:schemeClr val="accent2"/>
+    <dgm:linClrLst>
+      <a:schemeClr val="accent5"/>
+      <a:schemeClr val="accent6"/>
     </dgm:linClrLst>
     <dgm:effectClrLst/>
     <dgm:txLinClrLst/>
@@ -1910,8 +1949,9 @@
     <dgm:fillClrLst meth="repeat">
       <a:schemeClr val="lt1"/>
     </dgm:fillClrLst>
-    <dgm:linClrLst meth="repeat">
-      <a:schemeClr val="accent2"/>
+    <dgm:linClrLst>
+      <a:schemeClr val="accent5"/>
+      <a:schemeClr val="accent6"/>
     </dgm:linClrLst>
     <dgm:effectClrLst/>
     <dgm:txLinClrLst/>
@@ -1921,16 +1961,24 @@
     <dgm:txEffectClrLst/>
   </dgm:styleLbl>
   <dgm:styleLbl name="fgAccFollowNode1">
-    <dgm:fillClrLst meth="repeat">
-      <a:schemeClr val="accent2">
+    <dgm:fillClrLst>
+      <a:schemeClr val="accent5">
+        <a:tint val="40000"/>
         <a:alpha val="90000"/>
+      </a:schemeClr>
+      <a:schemeClr val="accent6">
         <a:tint val="40000"/>
+        <a:alpha val="90000"/>
       </a:schemeClr>
     </dgm:fillClrLst>
-    <dgm:linClrLst meth="repeat">
-      <a:schemeClr val="accent2">
+    <dgm:linClrLst>
+      <a:schemeClr val="accent5">
+        <a:tint val="40000"/>
         <a:alpha val="90000"/>
+      </a:schemeClr>
+      <a:schemeClr val="accent5">
         <a:tint val="40000"/>
+        <a:alpha val="90000"/>
       </a:schemeClr>
     </dgm:linClrLst>
     <dgm:effectClrLst/>
@@ -1941,16 +1989,24 @@
     <dgm:txEffectClrLst/>
   </dgm:styleLbl>
   <dgm:styleLbl name="alignAccFollowNode1">
-    <dgm:fillClrLst meth="repeat">
-      <a:schemeClr val="accent2">
+    <dgm:fillClrLst>
+      <a:schemeClr val="accent5">
+        <a:tint val="40000"/>
         <a:alpha val="90000"/>
+      </a:schemeClr>
+      <a:schemeClr val="accent6">
         <a:tint val="40000"/>
+        <a:alpha val="90000"/>
       </a:schemeClr>
     </dgm:fillClrLst>
-    <dgm:linClrLst meth="repeat">
-      <a:schemeClr val="accent2">
+    <dgm:linClrLst>
+      <a:schemeClr val="accent5">
+        <a:tint val="40000"/>
         <a:alpha val="90000"/>
+      </a:schemeClr>
+      <a:schemeClr val="accent6">
         <a:tint val="40000"/>
+        <a:alpha val="90000"/>
       </a:schemeClr>
     </dgm:linClrLst>
     <dgm:effectClrLst/>
@@ -1961,16 +2017,24 @@
     <dgm:txEffectClrLst/>
   </dgm:styleLbl>
   <dgm:styleLbl name="bgAccFollowNode1">
-    <dgm:fillClrLst meth="repeat">
-      <a:schemeClr val="accent2">
+    <dgm:fillClrLst>
+      <a:schemeClr val="accent5">
+        <a:tint val="40000"/>
         <a:alpha val="90000"/>
+      </a:schemeClr>
+      <a:schemeClr val="accent6">
         <a:tint val="40000"/>
+        <a:alpha val="90000"/>
       </a:schemeClr>
     </dgm:fillClrLst>
-    <dgm:linClrLst meth="repeat">
-      <a:schemeClr val="accent2">
+    <dgm:linClrLst>
+      <a:schemeClr val="accent5">
+        <a:tint val="40000"/>
         <a:alpha val="90000"/>
+      </a:schemeClr>
+      <a:schemeClr val="accent6">
         <a:tint val="40000"/>
+        <a:alpha val="90000"/>
       </a:schemeClr>
     </dgm:linClrLst>
     <dgm:effectClrLst/>
@@ -1986,8 +2050,8 @@
         <a:alpha val="90000"/>
       </a:schemeClr>
     </dgm:fillClrLst>
-    <dgm:linClrLst meth="repeat">
-      <a:schemeClr val="accent2"/>
+    <dgm:linClrLst>
+      <a:schemeClr val="accent4"/>
     </dgm:linClrLst>
     <dgm:effectClrLst/>
     <dgm:txLinClrLst/>
@@ -2002,8 +2066,8 @@
         <a:alpha val="90000"/>
       </a:schemeClr>
     </dgm:fillClrLst>
-    <dgm:linClrLst meth="repeat">
-      <a:schemeClr val="accent2"/>
+    <dgm:linClrLst>
+      <a:schemeClr val="accent6"/>
     </dgm:linClrLst>
     <dgm:effectClrLst/>
     <dgm:txLinClrLst/>
@@ -2018,8 +2082,8 @@
         <a:alpha val="90000"/>
       </a:schemeClr>
     </dgm:fillClrLst>
-    <dgm:linClrLst meth="repeat">
-      <a:schemeClr val="accent2"/>
+    <dgm:linClrLst>
+      <a:schemeClr val="accent1"/>
     </dgm:linClrLst>
     <dgm:effectClrLst/>
     <dgm:txLinClrLst/>
@@ -2034,7 +2098,7 @@
         <a:alpha val="90000"/>
       </a:schemeClr>
     </dgm:fillClrLst>
-    <dgm:linClrLst meth="repeat">
+    <dgm:linClrLst>
       <a:schemeClr val="accent2"/>
     </dgm:linClrLst>
     <dgm:effectClrLst/>
@@ -2046,26 +2110,28 @@
   </dgm:styleLbl>
   <dgm:styleLbl name="bgShp">
     <dgm:fillClrLst meth="repeat">
-      <a:schemeClr val="accent2"/>
+      <a:schemeClr val="bg1">
+        <a:lumMod val="95000"/>
+      </a:schemeClr>
     </dgm:fillClrLst>
     <dgm:linClrLst meth="repeat">
-      <a:schemeClr val="lt1">
-        <a:alpha val="0"/>
-      </a:schemeClr>
+      <a:schemeClr val="dk1"/>
     </dgm:linClrLst>
     <dgm:effectClrLst/>
     <dgm:txLinClrLst/>
-    <dgm:txFillClrLst/>
+    <dgm:txFillClrLst meth="repeat">
+      <a:schemeClr val="dk1"/>
+    </dgm:txFillClrLst>
     <dgm:txEffectClrLst/>
   </dgm:styleLbl>
   <dgm:styleLbl name="dkBgShp">
     <dgm:fillClrLst meth="repeat">
-      <a:schemeClr val="accent2">
-        <a:shade val="80000"/>
+      <a:schemeClr val="accent5">
+        <a:shade val="90000"/>
       </a:schemeClr>
     </dgm:fillClrLst>
     <dgm:linClrLst meth="repeat">
-      <a:schemeClr val="accent2"/>
+      <a:schemeClr val="dk1"/>
     </dgm:linClrLst>
     <dgm:effectClrLst/>
     <dgm:txLinClrLst/>
@@ -2076,13 +2142,13 @@
   </dgm:styleLbl>
   <dgm:styleLbl name="trBgShp">
     <dgm:fillClrLst meth="repeat">
-      <a:schemeClr val="accent2">
+      <a:schemeClr val="accent5">
         <a:tint val="50000"/>
         <a:alpha val="40000"/>
       </a:schemeClr>
     </dgm:fillClrLst>
     <dgm:linClrLst meth="repeat">
-      <a:schemeClr val="accent2"/>
+      <a:schemeClr val="accent5"/>
     </dgm:linClrLst>
     <dgm:effectClrLst/>
     <dgm:txLinClrLst/>
@@ -2093,8 +2159,8 @@
   </dgm:styleLbl>
   <dgm:styleLbl name="fgShp">
     <dgm:fillClrLst meth="repeat">
-      <a:schemeClr val="accent2">
-        <a:tint val="60000"/>
+      <a:schemeClr val="accent5">
+        <a:tint val="40000"/>
       </a:schemeClr>
     </dgm:fillClrLst>
     <dgm:linClrLst meth="repeat">
@@ -2132,7 +2198,7 @@
 <dgm:dataModel xmlns:dgm="http://schemas.openxmlformats.org/drawingml/2006/diagram" xmlns:a="http://schemas.openxmlformats.org/drawingml/2006/main">
   <dgm:ptLst>
     <dgm:pt modelId="{76711620-EBD7-470A-B364-1E2EC967F01A}" type="doc">
-      <dgm:prSet loTypeId="urn:microsoft.com/office/officeart/2018/5/layout/IconCircleLabelList" loCatId="icon" qsTypeId="urn:microsoft.com/office/officeart/2005/8/quickstyle/simple1" qsCatId="simple" csTypeId="urn:microsoft.com/office/officeart/2018/5/colors/Iconchunking_neutralicon_accent2_2" csCatId="accent2" phldr="1"/>
+      <dgm:prSet loTypeId="urn:microsoft.com/office/officeart/2018/5/layout/IconCircleLabelList" loCatId="icon" qsTypeId="urn:microsoft.com/office/officeart/2005/8/quickstyle/simple1" qsCatId="simple" csTypeId="urn:microsoft.com/office/officeart/2018/5/colors/Iconchunking_neutralbg_colorful5" csCatId="colorful" phldr="1"/>
       <dgm:spPr/>
       <dgm:t>
         <a:bodyPr/>
@@ -2150,6 +2216,9 @@
         <a:lstStyle/>
         <a:p>
           <a:pPr>
+            <a:lnSpc>
+              <a:spcPct val="100000"/>
+            </a:lnSpc>
             <a:defRPr cap="all"/>
           </a:pPr>
           <a:r>
@@ -2189,6 +2258,9 @@
         <a:lstStyle/>
         <a:p>
           <a:pPr>
+            <a:lnSpc>
+              <a:spcPct val="100000"/>
+            </a:lnSpc>
             <a:defRPr cap="all"/>
           </a:pPr>
           <a:r>
@@ -2228,6 +2300,9 @@
         <a:lstStyle/>
         <a:p>
           <a:pPr>
+            <a:lnSpc>
+              <a:spcPct val="100000"/>
+            </a:lnSpc>
             <a:defRPr cap="all"/>
           </a:pPr>
           <a:r>
@@ -2268,6 +2343,9 @@
         <a:lstStyle/>
         <a:p>
           <a:pPr>
+            <a:lnSpc>
+              <a:spcPct val="100000"/>
+            </a:lnSpc>
             <a:defRPr cap="all"/>
           </a:pPr>
           <a:r>
@@ -2577,14 +2655,15 @@
       </dsp:nvSpPr>
       <dsp:spPr>
         <a:xfrm>
-          <a:off x="800672" y="698685"/>
-          <a:ext cx="1256587" cy="1256587"/>
+          <a:off x="774129" y="709809"/>
+          <a:ext cx="1255425" cy="1255425"/>
         </a:xfrm>
         <a:prstGeom prst="ellipse">
           <a:avLst/>
         </a:prstGeom>
         <a:solidFill>
-          <a:schemeClr val="accent2">
+          <a:schemeClr val="bg1">
+            <a:lumMod val="95000"/>
             <a:hueOff val="0"/>
             <a:satOff val="0"/>
             <a:lumOff val="0"/>
@@ -2616,8 +2695,8 @@
       </dsp:nvSpPr>
       <dsp:spPr>
         <a:xfrm>
-          <a:off x="1068469" y="966482"/>
-          <a:ext cx="720993" cy="720993"/>
+          <a:off x="1041679" y="977359"/>
+          <a:ext cx="720326" cy="720326"/>
         </a:xfrm>
         <a:prstGeom prst="rect">
           <a:avLst/>
@@ -2665,8 +2744,8 @@
       </dsp:nvSpPr>
       <dsp:spPr>
         <a:xfrm>
-          <a:off x="398976" y="2346669"/>
-          <a:ext cx="2059980" cy="720000"/>
+          <a:off x="372805" y="2356270"/>
+          <a:ext cx="2058075" cy="720000"/>
         </a:xfrm>
         <a:prstGeom prst="rect">
           <a:avLst/>
@@ -2697,7 +2776,7 @@
         <a:p>
           <a:pPr marL="0" lvl="0" indent="0" algn="ctr" defTabSz="889000">
             <a:lnSpc>
-              <a:spcPct val="90000"/>
+              <a:spcPct val="100000"/>
             </a:lnSpc>
             <a:spcBef>
               <a:spcPct val="0"/>
@@ -2715,8 +2794,8 @@
         </a:p>
       </dsp:txBody>
       <dsp:txXfrm>
-        <a:off x="398976" y="2346669"/>
-        <a:ext cx="2059980" cy="720000"/>
+        <a:off x="372805" y="2356270"/>
+        <a:ext cx="2058075" cy="720000"/>
       </dsp:txXfrm>
     </dsp:sp>
     <dsp:sp modelId="{447B4303-A014-4513-B772-3CEBB6A55163}">
@@ -2726,14 +2805,15 @@
       </dsp:nvSpPr>
       <dsp:spPr>
         <a:xfrm>
-          <a:off x="3221148" y="698685"/>
-          <a:ext cx="1256587" cy="1256587"/>
+          <a:off x="3192368" y="709809"/>
+          <a:ext cx="1255425" cy="1255425"/>
         </a:xfrm>
         <a:prstGeom prst="ellipse">
           <a:avLst/>
         </a:prstGeom>
         <a:solidFill>
-          <a:schemeClr val="accent2">
+          <a:schemeClr val="bg1">
+            <a:lumMod val="95000"/>
             <a:hueOff val="0"/>
             <a:satOff val="0"/>
             <a:lumOff val="0"/>
@@ -2765,8 +2845,8 @@
       </dsp:nvSpPr>
       <dsp:spPr>
         <a:xfrm>
-          <a:off x="3488946" y="966482"/>
-          <a:ext cx="720993" cy="720993"/>
+          <a:off x="3459917" y="977359"/>
+          <a:ext cx="720326" cy="720326"/>
         </a:xfrm>
         <a:prstGeom prst="rect">
           <a:avLst/>
@@ -2814,8 +2894,8 @@
       </dsp:nvSpPr>
       <dsp:spPr>
         <a:xfrm>
-          <a:off x="2819452" y="2346669"/>
-          <a:ext cx="2059980" cy="720000"/>
+          <a:off x="2791043" y="2356270"/>
+          <a:ext cx="2058075" cy="720000"/>
         </a:xfrm>
         <a:prstGeom prst="rect">
           <a:avLst/>
@@ -2846,7 +2926,7 @@
         <a:p>
           <a:pPr marL="0" lvl="0" indent="0" algn="ctr" defTabSz="889000">
             <a:lnSpc>
-              <a:spcPct val="90000"/>
+              <a:spcPct val="100000"/>
             </a:lnSpc>
             <a:spcBef>
               <a:spcPct val="0"/>
@@ -2864,8 +2944,8 @@
         </a:p>
       </dsp:txBody>
       <dsp:txXfrm>
-        <a:off x="2819452" y="2346669"/>
-        <a:ext cx="2059980" cy="720000"/>
+        <a:off x="2791043" y="2356270"/>
+        <a:ext cx="2058075" cy="720000"/>
       </dsp:txXfrm>
     </dsp:sp>
     <dsp:sp modelId="{D131B22B-34C5-4BC3-B666-5510AD37B97D}">
@@ -2875,14 +2955,15 @@
       </dsp:nvSpPr>
       <dsp:spPr>
         <a:xfrm>
-          <a:off x="5641625" y="698685"/>
-          <a:ext cx="1256587" cy="1256587"/>
+          <a:off x="5610606" y="709809"/>
+          <a:ext cx="1255425" cy="1255425"/>
         </a:xfrm>
         <a:prstGeom prst="ellipse">
           <a:avLst/>
         </a:prstGeom>
         <a:solidFill>
-          <a:schemeClr val="accent2">
+          <a:schemeClr val="bg1">
+            <a:lumMod val="95000"/>
             <a:hueOff val="0"/>
             <a:satOff val="0"/>
             <a:lumOff val="0"/>
@@ -2914,8 +2995,8 @@
       </dsp:nvSpPr>
       <dsp:spPr>
         <a:xfrm>
-          <a:off x="5909422" y="966482"/>
-          <a:ext cx="720993" cy="720993"/>
+          <a:off x="5878155" y="977359"/>
+          <a:ext cx="720326" cy="720326"/>
         </a:xfrm>
         <a:prstGeom prst="rect">
           <a:avLst/>
@@ -2963,8 +3044,8 @@
       </dsp:nvSpPr>
       <dsp:spPr>
         <a:xfrm>
-          <a:off x="5239929" y="2346669"/>
-          <a:ext cx="2059980" cy="720000"/>
+          <a:off x="5209281" y="2356270"/>
+          <a:ext cx="2058075" cy="720000"/>
         </a:xfrm>
         <a:prstGeom prst="rect">
           <a:avLst/>
@@ -2995,7 +3076,7 @@
         <a:p>
           <a:pPr marL="0" lvl="0" indent="0" algn="ctr" defTabSz="889000">
             <a:lnSpc>
-              <a:spcPct val="90000"/>
+              <a:spcPct val="100000"/>
             </a:lnSpc>
             <a:spcBef>
               <a:spcPct val="0"/>
@@ -3014,8 +3095,8 @@
         </a:p>
       </dsp:txBody>
       <dsp:txXfrm>
-        <a:off x="5239929" y="2346669"/>
-        <a:ext cx="2059980" cy="720000"/>
+        <a:off x="5209281" y="2356270"/>
+        <a:ext cx="2058075" cy="720000"/>
       </dsp:txXfrm>
     </dsp:sp>
     <dsp:sp modelId="{4E0135BC-ED3B-422D-AC5A-A53EE6B423B1}">
@@ -3025,14 +3106,15 @@
       </dsp:nvSpPr>
       <dsp:spPr>
         <a:xfrm>
-          <a:off x="8062101" y="698685"/>
-          <a:ext cx="1256587" cy="1256587"/>
+          <a:off x="8028844" y="709809"/>
+          <a:ext cx="1255425" cy="1255425"/>
         </a:xfrm>
         <a:prstGeom prst="ellipse">
           <a:avLst/>
         </a:prstGeom>
         <a:solidFill>
-          <a:schemeClr val="accent2">
+          <a:schemeClr val="bg1">
+            <a:lumMod val="95000"/>
             <a:hueOff val="0"/>
             <a:satOff val="0"/>
             <a:lumOff val="0"/>
@@ -3064,8 +3146,8 @@
       </dsp:nvSpPr>
       <dsp:spPr>
         <a:xfrm>
-          <a:off x="8329899" y="966482"/>
-          <a:ext cx="720993" cy="720993"/>
+          <a:off x="8296394" y="977359"/>
+          <a:ext cx="720326" cy="720326"/>
         </a:xfrm>
         <a:prstGeom prst="rect">
           <a:avLst/>
@@ -3113,8 +3195,8 @@
       </dsp:nvSpPr>
       <dsp:spPr>
         <a:xfrm>
-          <a:off x="7660405" y="2346669"/>
-          <a:ext cx="2059980" cy="720000"/>
+          <a:off x="7627519" y="2356270"/>
+          <a:ext cx="2058075" cy="720000"/>
         </a:xfrm>
         <a:prstGeom prst="rect">
           <a:avLst/>
@@ -3145,7 +3227,7 @@
         <a:p>
           <a:pPr marL="0" lvl="0" indent="0" algn="ctr" defTabSz="889000">
             <a:lnSpc>
-              <a:spcPct val="90000"/>
+              <a:spcPct val="100000"/>
             </a:lnSpc>
             <a:spcBef>
               <a:spcPct val="0"/>
@@ -3164,8 +3246,8 @@
         </a:p>
       </dsp:txBody>
       <dsp:txXfrm>
-        <a:off x="7660405" y="2346669"/>
-        <a:ext cx="2059980" cy="720000"/>
+        <a:off x="7627519" y="2356270"/>
+        <a:ext cx="2058075" cy="720000"/>
       </dsp:txXfrm>
     </dsp:sp>
   </dsp:spTree>
@@ -4649,7 +4731,7 @@
           <a:p>
             <a:fld id="{0CD94E99-FA29-4EFF-88BE-3447E30E8C4D}" type="datetimeFigureOut">
               <a:rPr lang="en-GB" smtClean="0"/>
-              <a:t>07/02/2024</a:t>
+              <a:t>08/02/2024</a:t>
             </a:fld>
             <a:endParaRPr lang="en-GB"/>
           </a:p>
@@ -4738,7 +4820,7 @@
     </p:spTree>
     <p:extLst>
       <p:ext uri="{BB962C8B-B14F-4D97-AF65-F5344CB8AC3E}">
-        <p14:creationId xmlns:p14="http://schemas.microsoft.com/office/powerpoint/2010/main" val="3241991564"/>
+        <p14:creationId xmlns:p14="http://schemas.microsoft.com/office/powerpoint/2010/main" val="1032340772"/>
       </p:ext>
     </p:extLst>
   </p:cSld>
@@ -4857,7 +4939,7 @@
           <a:p>
             <a:fld id="{0CD94E99-FA29-4EFF-88BE-3447E30E8C4D}" type="datetimeFigureOut">
               <a:rPr lang="en-GB" smtClean="0"/>
-              <a:t>07/02/2024</a:t>
+              <a:t>08/02/2024</a:t>
             </a:fld>
             <a:endParaRPr lang="en-GB"/>
           </a:p>
@@ -4908,7 +4990,7 @@
     </p:spTree>
     <p:extLst>
       <p:ext uri="{BB962C8B-B14F-4D97-AF65-F5344CB8AC3E}">
-        <p14:creationId xmlns:p14="http://schemas.microsoft.com/office/powerpoint/2010/main" val="2857607483"/>
+        <p14:creationId xmlns:p14="http://schemas.microsoft.com/office/powerpoint/2010/main" val="508955739"/>
       </p:ext>
     </p:extLst>
   </p:cSld>
@@ -5115,7 +5197,7 @@
           <a:p>
             <a:fld id="{0CD94E99-FA29-4EFF-88BE-3447E30E8C4D}" type="datetimeFigureOut">
               <a:rPr lang="en-GB" smtClean="0"/>
-              <a:t>07/02/2024</a:t>
+              <a:t>08/02/2024</a:t>
             </a:fld>
             <a:endParaRPr lang="en-GB"/>
           </a:p>
@@ -5166,7 +5248,7 @@
     </p:spTree>
     <p:extLst>
       <p:ext uri="{BB962C8B-B14F-4D97-AF65-F5344CB8AC3E}">
-        <p14:creationId xmlns:p14="http://schemas.microsoft.com/office/powerpoint/2010/main" val="1851286086"/>
+        <p14:creationId xmlns:p14="http://schemas.microsoft.com/office/powerpoint/2010/main" val="4079772589"/>
       </p:ext>
     </p:extLst>
   </p:cSld>
@@ -5285,7 +5367,7 @@
           <a:p>
             <a:fld id="{0CD94E99-FA29-4EFF-88BE-3447E30E8C4D}" type="datetimeFigureOut">
               <a:rPr lang="en-GB" smtClean="0"/>
-              <a:t>07/02/2024</a:t>
+              <a:t>08/02/2024</a:t>
             </a:fld>
             <a:endParaRPr lang="en-GB"/>
           </a:p>
@@ -5336,7 +5418,7 @@
     </p:spTree>
     <p:extLst>
       <p:ext uri="{BB962C8B-B14F-4D97-AF65-F5344CB8AC3E}">
-        <p14:creationId xmlns:p14="http://schemas.microsoft.com/office/powerpoint/2010/main" val="3137031254"/>
+        <p14:creationId xmlns:p14="http://schemas.microsoft.com/office/powerpoint/2010/main" val="2634379243"/>
       </p:ext>
     </p:extLst>
   </p:cSld>
@@ -5622,7 +5704,7 @@
           <a:p>
             <a:fld id="{0CD94E99-FA29-4EFF-88BE-3447E30E8C4D}" type="datetimeFigureOut">
               <a:rPr lang="en-GB" smtClean="0"/>
-              <a:t>07/02/2024</a:t>
+              <a:t>08/02/2024</a:t>
             </a:fld>
             <a:endParaRPr lang="en-GB"/>
           </a:p>
@@ -5711,7 +5793,7 @@
     </p:spTree>
     <p:extLst>
       <p:ext uri="{BB962C8B-B14F-4D97-AF65-F5344CB8AC3E}">
-        <p14:creationId xmlns:p14="http://schemas.microsoft.com/office/powerpoint/2010/main" val="87194569"/>
+        <p14:creationId xmlns:p14="http://schemas.microsoft.com/office/powerpoint/2010/main" val="2601701279"/>
       </p:ext>
     </p:extLst>
   </p:cSld>
@@ -5897,7 +5979,7 @@
           <a:p>
             <a:fld id="{0CD94E99-FA29-4EFF-88BE-3447E30E8C4D}" type="datetimeFigureOut">
               <a:rPr lang="en-GB" smtClean="0"/>
-              <a:t>07/02/2024</a:t>
+              <a:t>08/02/2024</a:t>
             </a:fld>
             <a:endParaRPr lang="en-GB"/>
           </a:p>
@@ -5948,7 +6030,7 @@
     </p:spTree>
     <p:extLst>
       <p:ext uri="{BB962C8B-B14F-4D97-AF65-F5344CB8AC3E}">
-        <p14:creationId xmlns:p14="http://schemas.microsoft.com/office/powerpoint/2010/main" val="3829222606"/>
+        <p14:creationId xmlns:p14="http://schemas.microsoft.com/office/powerpoint/2010/main" val="2006694186"/>
       </p:ext>
     </p:extLst>
   </p:cSld>
@@ -6276,7 +6358,7 @@
           <a:p>
             <a:fld id="{0CD94E99-FA29-4EFF-88BE-3447E30E8C4D}" type="datetimeFigureOut">
               <a:rPr lang="en-GB" smtClean="0"/>
-              <a:t>07/02/2024</a:t>
+              <a:t>08/02/2024</a:t>
             </a:fld>
             <a:endParaRPr lang="en-GB"/>
           </a:p>
@@ -6327,7 +6409,7 @@
     </p:spTree>
     <p:extLst>
       <p:ext uri="{BB962C8B-B14F-4D97-AF65-F5344CB8AC3E}">
-        <p14:creationId xmlns:p14="http://schemas.microsoft.com/office/powerpoint/2010/main" val="436610953"/>
+        <p14:creationId xmlns:p14="http://schemas.microsoft.com/office/powerpoint/2010/main" val="2349671932"/>
       </p:ext>
     </p:extLst>
   </p:cSld>
@@ -6394,7 +6476,7 @@
           <a:p>
             <a:fld id="{0CD94E99-FA29-4EFF-88BE-3447E30E8C4D}" type="datetimeFigureOut">
               <a:rPr lang="en-GB" smtClean="0"/>
-              <a:t>07/02/2024</a:t>
+              <a:t>08/02/2024</a:t>
             </a:fld>
             <a:endParaRPr lang="en-GB"/>
           </a:p>
@@ -6445,7 +6527,7 @@
     </p:spTree>
     <p:extLst>
       <p:ext uri="{BB962C8B-B14F-4D97-AF65-F5344CB8AC3E}">
-        <p14:creationId xmlns:p14="http://schemas.microsoft.com/office/powerpoint/2010/main" val="1341179779"/>
+        <p14:creationId xmlns:p14="http://schemas.microsoft.com/office/powerpoint/2010/main" val="2885172000"/>
       </p:ext>
     </p:extLst>
   </p:cSld>
@@ -6567,7 +6649,7 @@
           <a:p>
             <a:fld id="{0CD94E99-FA29-4EFF-88BE-3447E30E8C4D}" type="datetimeFigureOut">
               <a:rPr lang="en-GB" smtClean="0"/>
-              <a:t>07/02/2024</a:t>
+              <a:t>08/02/2024</a:t>
             </a:fld>
             <a:endParaRPr lang="en-GB"/>
           </a:p>
@@ -6626,7 +6708,7 @@
     </p:spTree>
     <p:extLst>
       <p:ext uri="{BB962C8B-B14F-4D97-AF65-F5344CB8AC3E}">
-        <p14:creationId xmlns:p14="http://schemas.microsoft.com/office/powerpoint/2010/main" val="3582148105"/>
+        <p14:creationId xmlns:p14="http://schemas.microsoft.com/office/powerpoint/2010/main" val="873411810"/>
       </p:ext>
     </p:extLst>
   </p:cSld>
@@ -6923,7 +7005,7 @@
           <a:p>
             <a:fld id="{0CD94E99-FA29-4EFF-88BE-3447E30E8C4D}" type="datetimeFigureOut">
               <a:rPr lang="en-GB" smtClean="0"/>
-              <a:t>07/02/2024</a:t>
+              <a:t>08/02/2024</a:t>
             </a:fld>
             <a:endParaRPr lang="en-GB"/>
           </a:p>
@@ -6995,7 +7077,7 @@
     </p:spTree>
     <p:extLst>
       <p:ext uri="{BB962C8B-B14F-4D97-AF65-F5344CB8AC3E}">
-        <p14:creationId xmlns:p14="http://schemas.microsoft.com/office/powerpoint/2010/main" val="1510196390"/>
+        <p14:creationId xmlns:p14="http://schemas.microsoft.com/office/powerpoint/2010/main" val="1387623995"/>
       </p:ext>
     </p:extLst>
   </p:cSld>
@@ -7302,7 +7384,7 @@
           <a:p>
             <a:fld id="{0CD94E99-FA29-4EFF-88BE-3447E30E8C4D}" type="datetimeFigureOut">
               <a:rPr lang="en-GB" smtClean="0"/>
-              <a:t>07/02/2024</a:t>
+              <a:t>08/02/2024</a:t>
             </a:fld>
             <a:endParaRPr lang="en-GB"/>
           </a:p>
@@ -7353,7 +7435,7 @@
     </p:spTree>
     <p:extLst>
       <p:ext uri="{BB962C8B-B14F-4D97-AF65-F5344CB8AC3E}">
-        <p14:creationId xmlns:p14="http://schemas.microsoft.com/office/powerpoint/2010/main" val="2106726800"/>
+        <p14:creationId xmlns:p14="http://schemas.microsoft.com/office/powerpoint/2010/main" val="4025620083"/>
       </p:ext>
     </p:extLst>
   </p:cSld>
@@ -7591,7 +7673,7 @@
           <a:p>
             <a:fld id="{0CD94E99-FA29-4EFF-88BE-3447E30E8C4D}" type="datetimeFigureOut">
               <a:rPr lang="en-GB" smtClean="0"/>
-              <a:t>07/02/2024</a:t>
+              <a:t>08/02/2024</a:t>
             </a:fld>
             <a:endParaRPr lang="en-GB"/>
           </a:p>
@@ -7712,23 +7794,23 @@
     </p:spTree>
     <p:extLst>
       <p:ext uri="{BB962C8B-B14F-4D97-AF65-F5344CB8AC3E}">
-        <p14:creationId xmlns:p14="http://schemas.microsoft.com/office/powerpoint/2010/main" val="4265021884"/>
+        <p14:creationId xmlns:p14="http://schemas.microsoft.com/office/powerpoint/2010/main" val="2989193502"/>
       </p:ext>
     </p:extLst>
   </p:cSld>
   <p:clrMap bg1="lt1" tx1="dk1" bg2="lt2" tx2="dk2" accent1="accent1" accent2="accent2" accent3="accent3" accent4="accent4" accent5="accent5" accent6="accent6" hlink="hlink" folHlink="folHlink"/>
   <p:sldLayoutIdLst>
-    <p:sldLayoutId id="2147483757" r:id="rId1"/>
-    <p:sldLayoutId id="2147483758" r:id="rId2"/>
-    <p:sldLayoutId id="2147483759" r:id="rId3"/>
-    <p:sldLayoutId id="2147483760" r:id="rId4"/>
-    <p:sldLayoutId id="2147483761" r:id="rId5"/>
-    <p:sldLayoutId id="2147483762" r:id="rId6"/>
-    <p:sldLayoutId id="2147483763" r:id="rId7"/>
-    <p:sldLayoutId id="2147483764" r:id="rId8"/>
-    <p:sldLayoutId id="2147483765" r:id="rId9"/>
-    <p:sldLayoutId id="2147483766" r:id="rId10"/>
-    <p:sldLayoutId id="2147483767" r:id="rId11"/>
+    <p:sldLayoutId id="2147483885" r:id="rId1"/>
+    <p:sldLayoutId id="2147483886" r:id="rId2"/>
+    <p:sldLayoutId id="2147483887" r:id="rId3"/>
+    <p:sldLayoutId id="2147483888" r:id="rId4"/>
+    <p:sldLayoutId id="2147483889" r:id="rId5"/>
+    <p:sldLayoutId id="2147483890" r:id="rId6"/>
+    <p:sldLayoutId id="2147483891" r:id="rId7"/>
+    <p:sldLayoutId id="2147483892" r:id="rId8"/>
+    <p:sldLayoutId id="2147483893" r:id="rId9"/>
+    <p:sldLayoutId id="2147483894" r:id="rId10"/>
+    <p:sldLayoutId id="2147483895" r:id="rId11"/>
   </p:sldLayoutIdLst>
   <p:txStyles>
     <p:titleStyle>
@@ -8274,7 +8356,7 @@
     <p:bg>
       <p:bgPr>
         <a:solidFill>
-          <a:schemeClr val="bg2"/>
+          <a:schemeClr val="bg1"/>
         </a:solidFill>
         <a:effectLst/>
       </p:bgPr>
@@ -8311,17 +8393,16 @@
         </p:nvSpPr>
         <p:spPr>
           <a:xfrm>
-            <a:off x="1097280" y="4844374"/>
-            <a:ext cx="10058400" cy="1188995"/>
+            <a:off x="1097280" y="286603"/>
+            <a:ext cx="10058400" cy="1450757"/>
           </a:xfrm>
         </p:spPr>
         <p:txBody>
-          <a:bodyPr anchor="ctr">
+          <a:bodyPr>
             <a:normAutofit/>
           </a:bodyPr>
           <a:lstStyle/>
           <a:p>
-            <a:pPr algn="ctr"/>
             <a:r>
               <a:rPr lang="en-US"/>
               <a:t>Agenda	</a:t>
@@ -8346,14 +8427,14 @@
             <p:ph idx="1"/>
             <p:extLst>
               <p:ext uri="{D42A27DB-BD31-4B8C-83A1-F6EECF244321}">
-                <p14:modId xmlns:p14="http://schemas.microsoft.com/office/powerpoint/2010/main" val="813654728"/>
+                <p14:modId xmlns:p14="http://schemas.microsoft.com/office/powerpoint/2010/main" val="3477687710"/>
               </p:ext>
             </p:extLst>
           </p:nvPr>
         </p:nvGraphicFramePr>
         <p:xfrm>
-          <a:off x="1036319" y="680936"/>
-          <a:ext cx="10119362" cy="3765355"/>
+          <a:off x="1096963" y="2098515"/>
+          <a:ext cx="10058400" cy="3786080"/>
         </p:xfrm>
         <a:graphic>
           <a:graphicData uri="http://schemas.openxmlformats.org/drawingml/2006/diagram">
@@ -8741,8 +8822,8 @@
         </p:nvSpPr>
         <p:spPr>
           <a:xfrm>
-            <a:off x="2860318" y="2217714"/>
-            <a:ext cx="8865479" cy="987213"/>
+            <a:off x="2679826" y="2219218"/>
+            <a:ext cx="8865479" cy="985709"/>
           </a:xfrm>
           <a:prstGeom prst="rect">
             <a:avLst/>
@@ -9297,7 +9378,7 @@
     <p:bg>
       <p:bgPr>
         <a:solidFill>
-          <a:schemeClr val="bg2"/>
+          <a:schemeClr val="bg1"/>
         </a:solidFill>
         <a:effectLst/>
       </p:bgPr>
@@ -9334,8 +9415,8 @@
         </p:nvSpPr>
         <p:spPr>
           <a:xfrm>
-            <a:off x="492370" y="516835"/>
-            <a:ext cx="3084844" cy="5772840"/>
+            <a:off x="492369" y="523981"/>
+            <a:ext cx="9874255" cy="1099335"/>
           </a:xfrm>
         </p:spPr>
         <p:txBody>
@@ -9345,9 +9426,9 @@
           <a:lstStyle/>
           <a:p>
             <a:r>
-              <a:rPr lang="en-US" sz="3600">
+              <a:rPr lang="en-US" sz="3600" dirty="0">
                 <a:solidFill>
-                  <a:srgbClr val="FFFFFF"/>
+                  <a:schemeClr val="tx1"/>
                 </a:solidFill>
               </a:rPr>
               <a:t>Literature Review: Databases and Keywords</a:t>
@@ -9371,7 +9452,7 @@
         </p:nvSpPr>
         <p:spPr>
           <a:xfrm>
-            <a:off x="4594789" y="170628"/>
+            <a:off x="341288" y="2554232"/>
             <a:ext cx="5118357" cy="2579509"/>
           </a:xfrm>
           <a:prstGeom prst="rect">
@@ -9500,8 +9581,8 @@
         </p:nvSpPr>
         <p:spPr>
           <a:xfrm>
-            <a:off x="4594789" y="2681391"/>
-            <a:ext cx="5122745" cy="3779275"/>
+            <a:off x="6290025" y="2034119"/>
+            <a:ext cx="5122745" cy="4034172"/>
           </a:xfrm>
           <a:prstGeom prst="rect">
             <a:avLst/>
@@ -9762,15 +9843,8 @@
               <a:t>EdgeAI</a:t>
             </a:r>
             <a:r>
-              <a:rPr lang="en-GB" sz="7200" kern="1200" dirty="0">
-                <a:solidFill>
-                  <a:schemeClr val="tx1"/>
-                </a:solidFill>
-                <a:latin typeface="+mn-lt"/>
-                <a:ea typeface="+mn-ea"/>
-                <a:cs typeface="+mn-cs"/>
-              </a:rPr>
-              <a:t> OR </a:t>
+              <a:rPr lang="en-GB" sz="7200" dirty="0"/>
+              <a:t>/</a:t>
             </a:r>
             <a:r>
               <a:rPr lang="en-GB" sz="7200" kern="1200" dirty="0" err="1">
@@ -9784,15 +9858,8 @@
               <a:t>EdgeML</a:t>
             </a:r>
             <a:r>
-              <a:rPr lang="en-GB" sz="7200" kern="1200" dirty="0">
-                <a:solidFill>
-                  <a:schemeClr val="tx1"/>
-                </a:solidFill>
-                <a:latin typeface="+mn-lt"/>
-                <a:ea typeface="+mn-ea"/>
-                <a:cs typeface="+mn-cs"/>
-              </a:rPr>
-              <a:t> OR </a:t>
+              <a:rPr lang="en-GB" sz="7200" dirty="0"/>
+              <a:t>/</a:t>
             </a:r>
             <a:r>
               <a:rPr lang="en-GB" sz="7200" kern="1200" dirty="0" err="1">
@@ -9907,25 +9974,28 @@
             </a:r>
           </a:p>
           <a:p>
-            <a:pPr marL="461772" lvl="1" defTabSz="461772">
+            <a:pPr marL="1319022" lvl="1" indent="-857250" defTabSz="461772">
               <a:lnSpc>
                 <a:spcPct val="90000"/>
               </a:lnSpc>
               <a:spcAft>
                 <a:spcPts val="600"/>
               </a:spcAft>
+              <a:buFont typeface="Arial" panose="020B0604020202020204" pitchFamily="34" charset="0"/>
+              <a:buChar char="•"/>
             </a:pPr>
             <a:r>
-              <a:rPr lang="en-GB" sz="1500" kern="1200" dirty="0">
-                <a:solidFill>
-                  <a:schemeClr val="tx1"/>
-                </a:solidFill>
-                <a:latin typeface="+mn-lt"/>
-                <a:ea typeface="+mn-ea"/>
-                <a:cs typeface="+mn-cs"/>
-              </a:rPr>
+              <a:rPr lang="en-GB" sz="7200" dirty="0"/>
               <a:t>Intrusion Detection</a:t>
             </a:r>
+            <a:endParaRPr lang="en-GB" sz="7200" kern="1200" dirty="0">
+              <a:solidFill>
+                <a:schemeClr val="tx1"/>
+              </a:solidFill>
+              <a:latin typeface="+mn-lt"/>
+              <a:ea typeface="+mn-ea"/>
+              <a:cs typeface="+mn-cs"/>
+            </a:endParaRPr>
           </a:p>
           <a:p>
             <a:pPr lvl="1">
@@ -9958,40 +10028,40 @@
   <a:themeElements>
     <a:clrScheme name="Retrospect">
       <a:dk1>
-        <a:srgbClr val="000000"/>
+        <a:sysClr val="windowText" lastClr="000000"/>
       </a:dk1>
       <a:lt1>
-        <a:srgbClr val="FFFFFF"/>
+        <a:sysClr val="window" lastClr="FFFFFF"/>
       </a:lt1>
       <a:dk2>
-        <a:srgbClr val="46464A"/>
+        <a:srgbClr val="514949"/>
       </a:dk2>
       <a:lt2>
-        <a:srgbClr val="D1D9E1"/>
+        <a:srgbClr val="E1E1DB"/>
       </a:lt2>
       <a:accent1>
-        <a:srgbClr val="6F6F74"/>
+        <a:srgbClr val="9DBFBE"/>
       </a:accent1>
       <a:accent2>
-        <a:srgbClr val="A7B789"/>
+        <a:srgbClr val="DB8631"/>
       </a:accent2>
       <a:accent3>
-        <a:srgbClr val="BEAE98"/>
+        <a:srgbClr val="E3CC5A"/>
       </a:accent3>
       <a:accent4>
-        <a:srgbClr val="92A9B9"/>
+        <a:srgbClr val="ACADA8"/>
       </a:accent4>
       <a:accent5>
-        <a:srgbClr val="9C8265"/>
+        <a:srgbClr val="927C61"/>
       </a:accent5>
       <a:accent6>
-        <a:srgbClr val="8D6974"/>
+        <a:srgbClr val="B3B435"/>
       </a:accent6>
       <a:hlink>
-        <a:srgbClr val="67AABF"/>
+        <a:srgbClr val="0000FF"/>
       </a:hlink>
       <a:folHlink>
-        <a:srgbClr val="B1B5AB"/>
+        <a:srgbClr val="800080"/>
       </a:folHlink>
     </a:clrScheme>
     <a:fontScheme name="Retrospect">
@@ -10230,7 +10300,7 @@
   <a:extraClrSchemeLst/>
   <a:extLst>
     <a:ext uri="{05A4C25C-085E-4340-85A3-A5531E510DB2}">
-      <thm15:themeFamily xmlns:thm15="http://schemas.microsoft.com/office/thememl/2012/main" name="Retrospect" id="{5F128B03-DCCA-4EEB-AB3B-CF2899314A46}" vid="{BAB94BD4-5D6D-4148-AB57-A4CCF1FD4E0C}"/>
+      <thm15:themeFamily xmlns:thm15="http://schemas.microsoft.com/office/thememl/2012/main" name="Retrospect" id="{5F128B03-DCCA-4EEB-AB3B-CF2899314A46}" vid="{243AF7DC-D15B-41C0-AE81-23980D1B9FC4}"/>
     </a:ext>
   </a:extLst>
 </a:theme>

</xml_diff>

<commit_message>
Added some information to the keywords slides
</commit_message>
<xml_diff>
--- a/Presentations/Supervisor Meetings/2024/20240209.pptx
+++ b/Presentations/Supervisor Meetings/2024/20240209.pptx
@@ -119,7 +119,7 @@
 <file path=ppt/revisionInfo.xml><?xml version="1.0" encoding="utf-8"?>
 <p1510:revInfo xmlns:a="http://schemas.openxmlformats.org/drawingml/2006/main" xmlns:r="http://schemas.openxmlformats.org/officeDocument/2006/relationships" xmlns:p1510="http://schemas.microsoft.com/office/powerpoint/2015/10/main">
   <p1510:revLst>
-    <p1510:client id="{CA64B30F-511C-45F5-B991-1BF90300E7E0}" v="82" dt="2024-02-08T19:50:07.829"/>
+    <p1510:client id="{CA64B30F-511C-45F5-B991-1BF90300E7E0}" v="83" dt="2024-02-08T22:51:00.012"/>
   </p1510:revLst>
 </p1510:revInfo>
 </file>
@@ -129,7 +129,7 @@
   <pc:docChgLst>
     <pc:chgData name="Sean O Fithcheallaigh" userId="47659c31-a575-4792-8be3-61268c4ee0d6" providerId="ADAL" clId="{CA64B30F-511C-45F5-B991-1BF90300E7E0}"/>
     <pc:docChg chg="undo custSel mod addSld delSld modSld">
-      <pc:chgData name="Sean O Fithcheallaigh" userId="47659c31-a575-4792-8be3-61268c4ee0d6" providerId="ADAL" clId="{CA64B30F-511C-45F5-B991-1BF90300E7E0}" dt="2024-02-08T19:53:59.945" v="3716" actId="20577"/>
+      <pc:chgData name="Sean O Fithcheallaigh" userId="47659c31-a575-4792-8be3-61268c4ee0d6" providerId="ADAL" clId="{CA64B30F-511C-45F5-B991-1BF90300E7E0}" dt="2024-02-08T22:55:41.508" v="3946" actId="20577"/>
       <pc:docMkLst>
         <pc:docMk/>
       </pc:docMkLst>
@@ -739,7 +739,7 @@
         </pc:graphicFrameChg>
       </pc:sldChg>
       <pc:sldChg chg="addSp delSp modSp add mod setBg delDesignElem">
-        <pc:chgData name="Sean O Fithcheallaigh" userId="47659c31-a575-4792-8be3-61268c4ee0d6" providerId="ADAL" clId="{CA64B30F-511C-45F5-B991-1BF90300E7E0}" dt="2024-02-08T19:49:15.119" v="3648" actId="27636"/>
+        <pc:chgData name="Sean O Fithcheallaigh" userId="47659c31-a575-4792-8be3-61268c4ee0d6" providerId="ADAL" clId="{CA64B30F-511C-45F5-B991-1BF90300E7E0}" dt="2024-02-08T22:47:56.173" v="3731" actId="20577"/>
         <pc:sldMkLst>
           <pc:docMk/>
           <pc:sldMk cId="2143467693" sldId="259"/>
@@ -753,7 +753,7 @@
           </ac:spMkLst>
         </pc:spChg>
         <pc:spChg chg="mod ord">
-          <ac:chgData name="Sean O Fithcheallaigh" userId="47659c31-a575-4792-8be3-61268c4ee0d6" providerId="ADAL" clId="{CA64B30F-511C-45F5-B991-1BF90300E7E0}" dt="2024-02-08T19:47:17.733" v="3632" actId="14100"/>
+          <ac:chgData name="Sean O Fithcheallaigh" userId="47659c31-a575-4792-8be3-61268c4ee0d6" providerId="ADAL" clId="{CA64B30F-511C-45F5-B991-1BF90300E7E0}" dt="2024-02-08T22:47:56.173" v="3731" actId="20577"/>
           <ac:spMkLst>
             <pc:docMk/>
             <pc:sldMk cId="2143467693" sldId="259"/>
@@ -970,7 +970,7 @@
         </pc:cxnChg>
       </pc:sldChg>
       <pc:sldChg chg="addSp delSp modSp new mod setBg setClrOvrMap delDesignElem chgLayout">
-        <pc:chgData name="Sean O Fithcheallaigh" userId="47659c31-a575-4792-8be3-61268c4ee0d6" providerId="ADAL" clId="{CA64B30F-511C-45F5-B991-1BF90300E7E0}" dt="2024-02-08T19:53:59.945" v="3716" actId="20577"/>
+        <pc:chgData name="Sean O Fithcheallaigh" userId="47659c31-a575-4792-8be3-61268c4ee0d6" providerId="ADAL" clId="{CA64B30F-511C-45F5-B991-1BF90300E7E0}" dt="2024-02-08T22:55:41.508" v="3946" actId="20577"/>
         <pc:sldMkLst>
           <pc:docMk/>
           <pc:sldMk cId="164553243" sldId="260"/>
@@ -992,7 +992,7 @@
           </ac:spMkLst>
         </pc:spChg>
         <pc:spChg chg="add mod ord">
-          <ac:chgData name="Sean O Fithcheallaigh" userId="47659c31-a575-4792-8be3-61268c4ee0d6" providerId="ADAL" clId="{CA64B30F-511C-45F5-B991-1BF90300E7E0}" dt="2024-02-08T19:50:50.229" v="3657" actId="1076"/>
+          <ac:chgData name="Sean O Fithcheallaigh" userId="47659c31-a575-4792-8be3-61268c4ee0d6" providerId="ADAL" clId="{CA64B30F-511C-45F5-B991-1BF90300E7E0}" dt="2024-02-08T22:55:11.750" v="3937" actId="14100"/>
           <ac:spMkLst>
             <pc:docMk/>
             <pc:sldMk cId="164553243" sldId="260"/>
@@ -1000,11 +1000,19 @@
           </ac:spMkLst>
         </pc:spChg>
         <pc:spChg chg="add mod ord">
-          <ac:chgData name="Sean O Fithcheallaigh" userId="47659c31-a575-4792-8be3-61268c4ee0d6" providerId="ADAL" clId="{CA64B30F-511C-45F5-B991-1BF90300E7E0}" dt="2024-02-08T19:53:59.945" v="3716" actId="20577"/>
+          <ac:chgData name="Sean O Fithcheallaigh" userId="47659c31-a575-4792-8be3-61268c4ee0d6" providerId="ADAL" clId="{CA64B30F-511C-45F5-B991-1BF90300E7E0}" dt="2024-02-08T22:55:41.508" v="3946" actId="20577"/>
           <ac:spMkLst>
             <pc:docMk/>
             <pc:sldMk cId="164553243" sldId="260"/>
             <ac:spMk id="5" creationId="{55DC74A5-31C9-4AAD-A110-C2D6894BB4B8}"/>
+          </ac:spMkLst>
+        </pc:spChg>
+        <pc:spChg chg="add del mod">
+          <ac:chgData name="Sean O Fithcheallaigh" userId="47659c31-a575-4792-8be3-61268c4ee0d6" providerId="ADAL" clId="{CA64B30F-511C-45F5-B991-1BF90300E7E0}" dt="2024-02-08T22:54:57.741" v="3932" actId="478"/>
+          <ac:spMkLst>
+            <pc:docMk/>
+            <pc:sldMk cId="164553243" sldId="260"/>
+            <ac:spMk id="6" creationId="{3FC73A06-AA8C-4D7C-ADC8-6126E4B683C3}"/>
           </ac:spMkLst>
         </pc:spChg>
         <pc:spChg chg="add del mod">
@@ -8849,7 +8857,7 @@
                 <a:ea typeface="+mn-ea"/>
                 <a:cs typeface="+mn-cs"/>
               </a:rPr>
-              <a:t>The overreaching aim of this project will be to advance the understanding and application of federated learning in distributed environments, focusing on model efficiency, overall system security, and communication efficiency </a:t>
+              <a:t>The overreaching aim of this project will be to advance the understanding and application of federated learning in distributed environments, focusing on model efficiency, overall system security, and communication efficiency.</a:t>
             </a:r>
             <a:endParaRPr lang="en-GB" sz="1400" kern="1200" dirty="0">
               <a:solidFill>
@@ -8875,7 +8883,7 @@
                 <a:ea typeface="+mn-ea"/>
                 <a:cs typeface="+mn-cs"/>
               </a:rPr>
-              <a:t>Focusing on these area, we have some research questions as a starting point</a:t>
+              <a:t>Focusing on these area, we have some research questions as a starting point.</a:t>
             </a:r>
             <a:endParaRPr lang="en-US" sz="1400" dirty="0"/>
           </a:p>
@@ -9452,8 +9460,8 @@
         </p:nvSpPr>
         <p:spPr>
           <a:xfrm>
-            <a:off x="341288" y="2554232"/>
-            <a:ext cx="5118357" cy="2579509"/>
+            <a:off x="968011" y="2034119"/>
+            <a:ext cx="4169068" cy="2599526"/>
           </a:xfrm>
           <a:prstGeom prst="rect">
             <a:avLst/>
@@ -9581,8 +9589,8 @@
         </p:nvSpPr>
         <p:spPr>
           <a:xfrm>
-            <a:off x="6290025" y="2034119"/>
-            <a:ext cx="5122745" cy="4034172"/>
+            <a:off x="5794625" y="2034119"/>
+            <a:ext cx="5661060" cy="4459148"/>
           </a:xfrm>
           <a:prstGeom prst="rect">
             <a:avLst/>
@@ -9615,7 +9623,7 @@
             </a:r>
           </a:p>
           <a:p>
-            <a:pPr marL="1319022" lvl="1" indent="-857250" defTabSz="461772">
+            <a:pPr marL="861822" indent="-432000" defTabSz="461772">
               <a:lnSpc>
                 <a:spcPct val="90000"/>
               </a:lnSpc>
@@ -9638,7 +9646,7 @@
             </a:r>
           </a:p>
           <a:p>
-            <a:pPr marL="1319022" lvl="1" indent="-857250" defTabSz="461772">
+            <a:pPr marL="861822" indent="-432000" defTabSz="461772">
               <a:lnSpc>
                 <a:spcPct val="90000"/>
               </a:lnSpc>
@@ -9683,7 +9691,7 @@
             </a:r>
           </a:p>
           <a:p>
-            <a:pPr marL="1319022" lvl="1" indent="-857250" defTabSz="461772">
+            <a:pPr marL="861822" indent="-432000" defTabSz="461772">
               <a:lnSpc>
                 <a:spcPct val="90000"/>
               </a:lnSpc>
@@ -9702,11 +9710,30 @@
                 <a:ea typeface="+mn-ea"/>
                 <a:cs typeface="+mn-cs"/>
               </a:rPr>
-              <a:t>Internet or Things OR IoT</a:t>
-            </a:r>
-          </a:p>
-          <a:p>
-            <a:pPr marL="1319022" lvl="1" indent="-857250" defTabSz="461772">
+              <a:t>Internet </a:t>
+            </a:r>
+            <a:r>
+              <a:rPr lang="en-GB" sz="7200" kern="1200">
+                <a:solidFill>
+                  <a:schemeClr val="tx1"/>
+                </a:solidFill>
+                <a:latin typeface="+mn-lt"/>
+                <a:ea typeface="+mn-ea"/>
+                <a:cs typeface="+mn-cs"/>
+              </a:rPr>
+              <a:t>of Things/IoT</a:t>
+            </a:r>
+            <a:endParaRPr lang="en-GB" sz="7200" kern="1200" dirty="0">
+              <a:solidFill>
+                <a:schemeClr val="tx1"/>
+              </a:solidFill>
+              <a:latin typeface="+mn-lt"/>
+              <a:ea typeface="+mn-ea"/>
+              <a:cs typeface="+mn-cs"/>
+            </a:endParaRPr>
+          </a:p>
+          <a:p>
+            <a:pPr marL="861822" indent="-432000" defTabSz="461772">
               <a:lnSpc>
                 <a:spcPct val="90000"/>
               </a:lnSpc>
@@ -9729,7 +9756,7 @@
             </a:r>
           </a:p>
           <a:p>
-            <a:pPr marL="1319022" lvl="1" indent="-857250" defTabSz="461772">
+            <a:pPr marL="861822" indent="-432000" defTabSz="461772">
               <a:lnSpc>
                 <a:spcPct val="90000"/>
               </a:lnSpc>
@@ -9752,7 +9779,7 @@
             </a:r>
           </a:p>
           <a:p>
-            <a:pPr marL="1319022" lvl="1" indent="-857250" defTabSz="461772">
+            <a:pPr marL="861822" indent="-432000" defTabSz="461772">
               <a:lnSpc>
                 <a:spcPct val="90000"/>
               </a:lnSpc>
@@ -9775,7 +9802,7 @@
             </a:r>
           </a:p>
           <a:p>
-            <a:pPr marL="1319022" lvl="1" indent="-857250" defTabSz="461772">
+            <a:pPr marL="861822" indent="-432000" defTabSz="461772">
               <a:lnSpc>
                 <a:spcPct val="90000"/>
               </a:lnSpc>
@@ -9786,7 +9813,7 @@
               <a:buChar char="•"/>
             </a:pPr>
             <a:r>
-              <a:rPr lang="en-GB" sz="7200" kern="1200" dirty="0">
+              <a:rPr lang="en-GB" sz="7200" strike="sngStrike" kern="1200" dirty="0">
                 <a:solidFill>
                   <a:schemeClr val="tx1"/>
                 </a:solidFill>
@@ -9798,7 +9825,7 @@
             </a:r>
           </a:p>
           <a:p>
-            <a:pPr marL="1319022" lvl="1" indent="-857250" defTabSz="461772">
+            <a:pPr marL="861822" indent="-432000" defTabSz="461772">
               <a:lnSpc>
                 <a:spcPct val="90000"/>
               </a:lnSpc>
@@ -9809,7 +9836,7 @@
               <a:buChar char="•"/>
             </a:pPr>
             <a:r>
-              <a:rPr lang="en-GB" sz="7200" kern="1200" dirty="0">
+              <a:rPr lang="en-GB" sz="7200" strike="sngStrike" kern="1200" dirty="0">
                 <a:solidFill>
                   <a:schemeClr val="tx1"/>
                 </a:solidFill>
@@ -9821,7 +9848,7 @@
             </a:r>
           </a:p>
           <a:p>
-            <a:pPr marL="1319022" lvl="1" indent="-857250" defTabSz="461772">
+            <a:pPr marL="861822" indent="-432000" defTabSz="461772">
               <a:lnSpc>
                 <a:spcPct val="90000"/>
               </a:lnSpc>
@@ -9882,7 +9909,7 @@
             </a:endParaRPr>
           </a:p>
           <a:p>
-            <a:pPr marL="1319022" lvl="1" indent="-857250" defTabSz="461772">
+            <a:pPr marL="861822" indent="-432000" defTabSz="461772">
               <a:lnSpc>
                 <a:spcPct val="90000"/>
               </a:lnSpc>
@@ -9905,7 +9932,7 @@
             </a:r>
           </a:p>
           <a:p>
-            <a:pPr marL="1319022" lvl="1" indent="-857250" defTabSz="461772">
+            <a:pPr marL="861822" indent="-432000" defTabSz="461772">
               <a:lnSpc>
                 <a:spcPct val="90000"/>
               </a:lnSpc>
@@ -9916,7 +9943,7 @@
               <a:buChar char="•"/>
             </a:pPr>
             <a:r>
-              <a:rPr lang="en-GB" sz="7200" kern="1200" dirty="0">
+              <a:rPr lang="en-GB" sz="7200" strike="sngStrike" kern="1200" dirty="0">
                 <a:solidFill>
                   <a:schemeClr val="tx1"/>
                 </a:solidFill>
@@ -9928,7 +9955,7 @@
             </a:r>
           </a:p>
           <a:p>
-            <a:pPr marL="1319022" lvl="1" indent="-857250" defTabSz="461772">
+            <a:pPr marL="861822" indent="-432000" defTabSz="461772">
               <a:lnSpc>
                 <a:spcPct val="90000"/>
               </a:lnSpc>
@@ -9951,7 +9978,7 @@
             </a:r>
           </a:p>
           <a:p>
-            <a:pPr marL="1319022" lvl="1" indent="-857250" defTabSz="461772">
+            <a:pPr marL="861822" indent="-432000" defTabSz="461772">
               <a:lnSpc>
                 <a:spcPct val="90000"/>
               </a:lnSpc>
@@ -9974,7 +10001,7 @@
             </a:r>
           </a:p>
           <a:p>
-            <a:pPr marL="1319022" lvl="1" indent="-857250" defTabSz="461772">
+            <a:pPr marL="861822" indent="-432000" defTabSz="461772">
               <a:lnSpc>
                 <a:spcPct val="90000"/>
               </a:lnSpc>

</xml_diff>

<commit_message>
strike through RQs as I modify them for new presentation
</commit_message>
<xml_diff>
--- a/Presentations/Supervisor Meetings/2024/20240209.pptx
+++ b/Presentations/Supervisor Meetings/2024/20240209.pptx
@@ -117,14 +117,6 @@
 </p:presentation>
 </file>
 
-<file path=ppt/revisionInfo.xml><?xml version="1.0" encoding="utf-8"?>
-<p1510:revInfo xmlns:a="http://schemas.openxmlformats.org/drawingml/2006/main" xmlns:r="http://schemas.openxmlformats.org/officeDocument/2006/relationships" xmlns:p1510="http://schemas.microsoft.com/office/powerpoint/2015/10/main">
-  <p1510:revLst>
-    <p1510:client id="{CA64B30F-511C-45F5-B991-1BF90300E7E0}" v="88" dt="2024-02-10T16:34:53.639"/>
-  </p1510:revLst>
-</p1510:revInfo>
-</file>
-
 <file path=ppt/changesInfos/changesInfo1.xml><?xml version="1.0" encoding="utf-8"?>
 <pc:chgInfo xmlns:a="http://schemas.openxmlformats.org/drawingml/2006/main" xmlns:r="http://schemas.openxmlformats.org/officeDocument/2006/relationships" xmlns:ac="http://schemas.microsoft.com/office/drawing/2013/main/command" xmlns:pc="http://schemas.microsoft.com/office/powerpoint/2013/main/command">
   <pc:docChgLst>
@@ -1476,6 +1468,30 @@
           </pc:sldLayoutMkLst>
         </pc:sldLayoutChg>
       </pc:sldMasterChg>
+    </pc:docChg>
+  </pc:docChgLst>
+  <pc:docChgLst>
+    <pc:chgData name="Sean O Fithcheallaigh" userId="47659c31-a575-4792-8be3-61268c4ee0d6" providerId="ADAL" clId="{F0BCD894-50B2-4D23-A82D-5E52D8436338}"/>
+    <pc:docChg chg="undo custSel modSld">
+      <pc:chgData name="Sean O Fithcheallaigh" userId="47659c31-a575-4792-8be3-61268c4ee0d6" providerId="ADAL" clId="{F0BCD894-50B2-4D23-A82D-5E52D8436338}" dt="2024-02-16T15:06:47.683" v="4" actId="400"/>
+      <pc:docMkLst>
+        <pc:docMk/>
+      </pc:docMkLst>
+      <pc:sldChg chg="modSp mod">
+        <pc:chgData name="Sean O Fithcheallaigh" userId="47659c31-a575-4792-8be3-61268c4ee0d6" providerId="ADAL" clId="{F0BCD894-50B2-4D23-A82D-5E52D8436338}" dt="2024-02-16T15:06:47.683" v="4" actId="400"/>
+        <pc:sldMkLst>
+          <pc:docMk/>
+          <pc:sldMk cId="2143467693" sldId="259"/>
+        </pc:sldMkLst>
+        <pc:spChg chg="mod">
+          <ac:chgData name="Sean O Fithcheallaigh" userId="47659c31-a575-4792-8be3-61268c4ee0d6" providerId="ADAL" clId="{F0BCD894-50B2-4D23-A82D-5E52D8436338}" dt="2024-02-16T15:06:47.683" v="4" actId="400"/>
+          <ac:spMkLst>
+            <pc:docMk/>
+            <pc:sldMk cId="2143467693" sldId="259"/>
+            <ac:spMk id="21" creationId="{B1BF8FF0-C5F9-44EC-AB52-3D3EA590CDC6}"/>
+          </ac:spMkLst>
+        </pc:spChg>
+      </pc:sldChg>
     </pc:docChg>
   </pc:docChgLst>
   <pc:docChgLst>
@@ -4857,7 +4873,7 @@
           <a:p>
             <a:fld id="{0CD94E99-FA29-4EFF-88BE-3447E30E8C4D}" type="datetimeFigureOut">
               <a:rPr lang="en-GB" smtClean="0"/>
-              <a:t>10/02/2024</a:t>
+              <a:t>16/02/2024</a:t>
             </a:fld>
             <a:endParaRPr lang="en-GB"/>
           </a:p>
@@ -5065,7 +5081,7 @@
           <a:p>
             <a:fld id="{0CD94E99-FA29-4EFF-88BE-3447E30E8C4D}" type="datetimeFigureOut">
               <a:rPr lang="en-GB" smtClean="0"/>
-              <a:t>10/02/2024</a:t>
+              <a:t>16/02/2024</a:t>
             </a:fld>
             <a:endParaRPr lang="en-GB"/>
           </a:p>
@@ -5323,7 +5339,7 @@
           <a:p>
             <a:fld id="{0CD94E99-FA29-4EFF-88BE-3447E30E8C4D}" type="datetimeFigureOut">
               <a:rPr lang="en-GB" smtClean="0"/>
-              <a:t>10/02/2024</a:t>
+              <a:t>16/02/2024</a:t>
             </a:fld>
             <a:endParaRPr lang="en-GB"/>
           </a:p>
@@ -5493,7 +5509,7 @@
           <a:p>
             <a:fld id="{0CD94E99-FA29-4EFF-88BE-3447E30E8C4D}" type="datetimeFigureOut">
               <a:rPr lang="en-GB" smtClean="0"/>
-              <a:t>10/02/2024</a:t>
+              <a:t>16/02/2024</a:t>
             </a:fld>
             <a:endParaRPr lang="en-GB"/>
           </a:p>
@@ -5830,7 +5846,7 @@
           <a:p>
             <a:fld id="{0CD94E99-FA29-4EFF-88BE-3447E30E8C4D}" type="datetimeFigureOut">
               <a:rPr lang="en-GB" smtClean="0"/>
-              <a:t>10/02/2024</a:t>
+              <a:t>16/02/2024</a:t>
             </a:fld>
             <a:endParaRPr lang="en-GB"/>
           </a:p>
@@ -6110,7 +6126,7 @@
           <a:p>
             <a:fld id="{0CD94E99-FA29-4EFF-88BE-3447E30E8C4D}" type="datetimeFigureOut">
               <a:rPr lang="en-GB" smtClean="0"/>
-              <a:t>10/02/2024</a:t>
+              <a:t>16/02/2024</a:t>
             </a:fld>
             <a:endParaRPr lang="en-GB"/>
           </a:p>
@@ -6489,7 +6505,7 @@
           <a:p>
             <a:fld id="{0CD94E99-FA29-4EFF-88BE-3447E30E8C4D}" type="datetimeFigureOut">
               <a:rPr lang="en-GB" smtClean="0"/>
-              <a:t>10/02/2024</a:t>
+              <a:t>16/02/2024</a:t>
             </a:fld>
             <a:endParaRPr lang="en-GB"/>
           </a:p>
@@ -6607,7 +6623,7 @@
           <a:p>
             <a:fld id="{0CD94E99-FA29-4EFF-88BE-3447E30E8C4D}" type="datetimeFigureOut">
               <a:rPr lang="en-GB" smtClean="0"/>
-              <a:t>10/02/2024</a:t>
+              <a:t>16/02/2024</a:t>
             </a:fld>
             <a:endParaRPr lang="en-GB"/>
           </a:p>
@@ -6780,7 +6796,7 @@
           <a:p>
             <a:fld id="{0CD94E99-FA29-4EFF-88BE-3447E30E8C4D}" type="datetimeFigureOut">
               <a:rPr lang="en-GB" smtClean="0"/>
-              <a:t>10/02/2024</a:t>
+              <a:t>16/02/2024</a:t>
             </a:fld>
             <a:endParaRPr lang="en-GB"/>
           </a:p>
@@ -7136,7 +7152,7 @@
           <a:p>
             <a:fld id="{0CD94E99-FA29-4EFF-88BE-3447E30E8C4D}" type="datetimeFigureOut">
               <a:rPr lang="en-GB" smtClean="0"/>
-              <a:t>10/02/2024</a:t>
+              <a:t>16/02/2024</a:t>
             </a:fld>
             <a:endParaRPr lang="en-GB"/>
           </a:p>
@@ -7515,7 +7531,7 @@
           <a:p>
             <a:fld id="{0CD94E99-FA29-4EFF-88BE-3447E30E8C4D}" type="datetimeFigureOut">
               <a:rPr lang="en-GB" smtClean="0"/>
-              <a:t>10/02/2024</a:t>
+              <a:t>16/02/2024</a:t>
             </a:fld>
             <a:endParaRPr lang="en-GB"/>
           </a:p>
@@ -7804,7 +7820,7 @@
           <a:p>
             <a:fld id="{0CD94E99-FA29-4EFF-88BE-3447E30E8C4D}" type="datetimeFigureOut">
               <a:rPr lang="en-GB" smtClean="0"/>
-              <a:t>10/02/2024</a:t>
+              <a:t>16/02/2024</a:t>
             </a:fld>
             <a:endParaRPr lang="en-GB"/>
           </a:p>
@@ -9210,7 +9226,7 @@
               </a:spcBef>
             </a:pPr>
             <a:r>
-              <a:rPr lang="en-US" sz="1400" kern="1200" dirty="0">
+              <a:rPr lang="en-US" sz="1400" strike="sngStrike" kern="1200" dirty="0">
                 <a:solidFill>
                   <a:schemeClr val="tx1"/>
                 </a:solidFill>
@@ -9221,7 +9237,7 @@
               <a:t>RQ1: 	With the ever-increasing use of IoT devices, </a:t>
             </a:r>
             <a:r>
-              <a:rPr lang="en-US" sz="1400" b="1" kern="1200" dirty="0">
+              <a:rPr lang="en-US" sz="1400" b="1" strike="sngStrike" kern="1200" dirty="0">
                 <a:solidFill>
                   <a:schemeClr val="tx1"/>
                 </a:solidFill>
@@ -9232,7 +9248,7 @@
               <a:t>can</a:t>
             </a:r>
             <a:r>
-              <a:rPr lang="en-US" sz="1400" kern="1200" dirty="0">
+              <a:rPr lang="en-US" sz="1400" strike="sngStrike" kern="1200" dirty="0">
                 <a:solidFill>
                   <a:schemeClr val="tx1"/>
                 </a:solidFill>
@@ -9243,7 +9259,7 @@
               <a:t> </a:t>
             </a:r>
             <a:r>
-              <a:rPr lang="en-US" sz="1400" b="1" kern="1200" dirty="0">
+              <a:rPr lang="en-US" sz="1400" b="1" strike="sngStrike" kern="1200" dirty="0">
                 <a:solidFill>
                   <a:schemeClr val="tx1"/>
                 </a:solidFill>
@@ -9254,7 +9270,7 @@
               <a:t>FL algorithms or tools be designed to operate specifically on 	resource Edge devices</a:t>
             </a:r>
             <a:r>
-              <a:rPr lang="en-US" sz="1400" kern="1200" dirty="0">
+              <a:rPr lang="en-US" sz="1400" strike="sngStrike" kern="1200" dirty="0">
                 <a:solidFill>
                   <a:schemeClr val="tx1"/>
                 </a:solidFill>
@@ -9272,7 +9288,7 @@
               </a:spcBef>
             </a:pPr>
             <a:r>
-              <a:rPr lang="en-US" sz="1400" kern="1200" dirty="0">
+              <a:rPr lang="en-US" sz="1400" strike="sngStrike" kern="1200" dirty="0">
                 <a:solidFill>
                   <a:schemeClr val="tx1"/>
                 </a:solidFill>
@@ -9283,7 +9299,7 @@
               <a:t>RQ2: 	Real-world data will typically have elements of variability that can reduce the accuracy of any model. </a:t>
             </a:r>
             <a:r>
-              <a:rPr lang="en-US" sz="1400" b="1" kern="1200" dirty="0">
+              <a:rPr lang="en-US" sz="1400" b="1" strike="sngStrike" kern="1200" dirty="0">
                 <a:solidFill>
                   <a:schemeClr val="tx1"/>
                 </a:solidFill>
@@ -9294,11 +9310,11 @@
               <a:t>Can we 	develop FL algorithms that are adaptable to non IID (Independently and Identically Distributed </a:t>
             </a:r>
             <a:r>
-              <a:rPr lang="en-US" sz="1400" b="1" dirty="0"/>
+              <a:rPr lang="en-US" sz="1400" b="1" strike="sngStrike" dirty="0"/>
               <a:t>D</a:t>
             </a:r>
             <a:r>
-              <a:rPr lang="en-US" sz="1400" b="1" kern="1200" dirty="0">
+              <a:rPr lang="en-US" sz="1400" b="1" strike="sngStrike" kern="1200" dirty="0">
                 <a:solidFill>
                   <a:schemeClr val="tx1"/>
                 </a:solidFill>
@@ -9356,7 +9372,7 @@
               </a:spcBef>
             </a:pPr>
             <a:r>
-              <a:rPr lang="en-US" sz="1400" kern="1200" dirty="0">
+              <a:rPr lang="en-US" sz="1400" strike="sngStrike" kern="1200" dirty="0">
                 <a:solidFill>
                   <a:schemeClr val="tx1"/>
                 </a:solidFill>
@@ -9367,7 +9383,7 @@
               <a:t>RQ4: 	</a:t>
             </a:r>
             <a:r>
-              <a:rPr lang="en-US" sz="1400" b="1" kern="1200" dirty="0">
+              <a:rPr lang="en-US" sz="1400" b="1" strike="sngStrike" kern="1200" dirty="0">
                 <a:solidFill>
                   <a:schemeClr val="tx1"/>
                 </a:solidFill>
@@ -9378,7 +9394,7 @@
               <a:t>Can FL be resilient to unreliable network conditions </a:t>
             </a:r>
             <a:r>
-              <a:rPr lang="en-US" sz="1400" kern="1200" dirty="0">
+              <a:rPr lang="en-US" sz="1400" strike="sngStrike" kern="1200" dirty="0">
                 <a:solidFill>
                   <a:schemeClr val="tx1"/>
                 </a:solidFill>

</xml_diff>

<commit_message>
Strike through one RQ
</commit_message>
<xml_diff>
--- a/Presentations/Supervisor Meetings/2024/20240209.pptx
+++ b/Presentations/Supervisor Meetings/2024/20240209.pptx
@@ -1473,18 +1473,18 @@
   <pc:docChgLst>
     <pc:chgData name="Sean O Fithcheallaigh" userId="47659c31-a575-4792-8be3-61268c4ee0d6" providerId="ADAL" clId="{F0BCD894-50B2-4D23-A82D-5E52D8436338}"/>
     <pc:docChg chg="undo custSel modSld">
-      <pc:chgData name="Sean O Fithcheallaigh" userId="47659c31-a575-4792-8be3-61268c4ee0d6" providerId="ADAL" clId="{F0BCD894-50B2-4D23-A82D-5E52D8436338}" dt="2024-02-16T15:06:47.683" v="4" actId="400"/>
+      <pc:chgData name="Sean O Fithcheallaigh" userId="47659c31-a575-4792-8be3-61268c4ee0d6" providerId="ADAL" clId="{F0BCD894-50B2-4D23-A82D-5E52D8436338}" dt="2024-02-18T22:50:59.547" v="5" actId="400"/>
       <pc:docMkLst>
         <pc:docMk/>
       </pc:docMkLst>
       <pc:sldChg chg="modSp mod">
-        <pc:chgData name="Sean O Fithcheallaigh" userId="47659c31-a575-4792-8be3-61268c4ee0d6" providerId="ADAL" clId="{F0BCD894-50B2-4D23-A82D-5E52D8436338}" dt="2024-02-16T15:06:47.683" v="4" actId="400"/>
+        <pc:chgData name="Sean O Fithcheallaigh" userId="47659c31-a575-4792-8be3-61268c4ee0d6" providerId="ADAL" clId="{F0BCD894-50B2-4D23-A82D-5E52D8436338}" dt="2024-02-18T22:50:59.547" v="5" actId="400"/>
         <pc:sldMkLst>
           <pc:docMk/>
           <pc:sldMk cId="2143467693" sldId="259"/>
         </pc:sldMkLst>
         <pc:spChg chg="mod">
-          <ac:chgData name="Sean O Fithcheallaigh" userId="47659c31-a575-4792-8be3-61268c4ee0d6" providerId="ADAL" clId="{F0BCD894-50B2-4D23-A82D-5E52D8436338}" dt="2024-02-16T15:06:47.683" v="4" actId="400"/>
+          <ac:chgData name="Sean O Fithcheallaigh" userId="47659c31-a575-4792-8be3-61268c4ee0d6" providerId="ADAL" clId="{F0BCD894-50B2-4D23-A82D-5E52D8436338}" dt="2024-02-18T22:50:59.547" v="5" actId="400"/>
           <ac:spMkLst>
             <pc:docMk/>
             <pc:sldMk cId="2143467693" sldId="259"/>
@@ -4873,7 +4873,7 @@
           <a:p>
             <a:fld id="{0CD94E99-FA29-4EFF-88BE-3447E30E8C4D}" type="datetimeFigureOut">
               <a:rPr lang="en-GB" smtClean="0"/>
-              <a:t>16/02/2024</a:t>
+              <a:t>18/02/2024</a:t>
             </a:fld>
             <a:endParaRPr lang="en-GB"/>
           </a:p>
@@ -5081,7 +5081,7 @@
           <a:p>
             <a:fld id="{0CD94E99-FA29-4EFF-88BE-3447E30E8C4D}" type="datetimeFigureOut">
               <a:rPr lang="en-GB" smtClean="0"/>
-              <a:t>16/02/2024</a:t>
+              <a:t>18/02/2024</a:t>
             </a:fld>
             <a:endParaRPr lang="en-GB"/>
           </a:p>
@@ -5339,7 +5339,7 @@
           <a:p>
             <a:fld id="{0CD94E99-FA29-4EFF-88BE-3447E30E8C4D}" type="datetimeFigureOut">
               <a:rPr lang="en-GB" smtClean="0"/>
-              <a:t>16/02/2024</a:t>
+              <a:t>18/02/2024</a:t>
             </a:fld>
             <a:endParaRPr lang="en-GB"/>
           </a:p>
@@ -5509,7 +5509,7 @@
           <a:p>
             <a:fld id="{0CD94E99-FA29-4EFF-88BE-3447E30E8C4D}" type="datetimeFigureOut">
               <a:rPr lang="en-GB" smtClean="0"/>
-              <a:t>16/02/2024</a:t>
+              <a:t>18/02/2024</a:t>
             </a:fld>
             <a:endParaRPr lang="en-GB"/>
           </a:p>
@@ -5846,7 +5846,7 @@
           <a:p>
             <a:fld id="{0CD94E99-FA29-4EFF-88BE-3447E30E8C4D}" type="datetimeFigureOut">
               <a:rPr lang="en-GB" smtClean="0"/>
-              <a:t>16/02/2024</a:t>
+              <a:t>18/02/2024</a:t>
             </a:fld>
             <a:endParaRPr lang="en-GB"/>
           </a:p>
@@ -6126,7 +6126,7 @@
           <a:p>
             <a:fld id="{0CD94E99-FA29-4EFF-88BE-3447E30E8C4D}" type="datetimeFigureOut">
               <a:rPr lang="en-GB" smtClean="0"/>
-              <a:t>16/02/2024</a:t>
+              <a:t>18/02/2024</a:t>
             </a:fld>
             <a:endParaRPr lang="en-GB"/>
           </a:p>
@@ -6505,7 +6505,7 @@
           <a:p>
             <a:fld id="{0CD94E99-FA29-4EFF-88BE-3447E30E8C4D}" type="datetimeFigureOut">
               <a:rPr lang="en-GB" smtClean="0"/>
-              <a:t>16/02/2024</a:t>
+              <a:t>18/02/2024</a:t>
             </a:fld>
             <a:endParaRPr lang="en-GB"/>
           </a:p>
@@ -6623,7 +6623,7 @@
           <a:p>
             <a:fld id="{0CD94E99-FA29-4EFF-88BE-3447E30E8C4D}" type="datetimeFigureOut">
               <a:rPr lang="en-GB" smtClean="0"/>
-              <a:t>16/02/2024</a:t>
+              <a:t>18/02/2024</a:t>
             </a:fld>
             <a:endParaRPr lang="en-GB"/>
           </a:p>
@@ -6796,7 +6796,7 @@
           <a:p>
             <a:fld id="{0CD94E99-FA29-4EFF-88BE-3447E30E8C4D}" type="datetimeFigureOut">
               <a:rPr lang="en-GB" smtClean="0"/>
-              <a:t>16/02/2024</a:t>
+              <a:t>18/02/2024</a:t>
             </a:fld>
             <a:endParaRPr lang="en-GB"/>
           </a:p>
@@ -7152,7 +7152,7 @@
           <a:p>
             <a:fld id="{0CD94E99-FA29-4EFF-88BE-3447E30E8C4D}" type="datetimeFigureOut">
               <a:rPr lang="en-GB" smtClean="0"/>
-              <a:t>16/02/2024</a:t>
+              <a:t>18/02/2024</a:t>
             </a:fld>
             <a:endParaRPr lang="en-GB"/>
           </a:p>
@@ -7531,7 +7531,7 @@
           <a:p>
             <a:fld id="{0CD94E99-FA29-4EFF-88BE-3447E30E8C4D}" type="datetimeFigureOut">
               <a:rPr lang="en-GB" smtClean="0"/>
-              <a:t>16/02/2024</a:t>
+              <a:t>18/02/2024</a:t>
             </a:fld>
             <a:endParaRPr lang="en-GB"/>
           </a:p>
@@ -7820,7 +7820,7 @@
           <a:p>
             <a:fld id="{0CD94E99-FA29-4EFF-88BE-3447E30E8C4D}" type="datetimeFigureOut">
               <a:rPr lang="en-GB" smtClean="0"/>
-              <a:t>16/02/2024</a:t>
+              <a:t>18/02/2024</a:t>
             </a:fld>
             <a:endParaRPr lang="en-GB"/>
           </a:p>
@@ -9412,7 +9412,7 @@
               </a:spcBef>
             </a:pPr>
             <a:r>
-              <a:rPr lang="en-US" sz="1400" kern="1200" dirty="0">
+              <a:rPr lang="en-US" sz="1400" strike="sngStrike" kern="1200" dirty="0">
                 <a:solidFill>
                   <a:schemeClr val="tx1"/>
                 </a:solidFill>
@@ -9423,7 +9423,7 @@
               <a:t>RQ5:	</a:t>
             </a:r>
             <a:r>
-              <a:rPr lang="en-US" sz="1400" b="1" kern="1200" dirty="0">
+              <a:rPr lang="en-US" sz="1400" b="1" strike="sngStrike" kern="1200" dirty="0">
                 <a:solidFill>
                   <a:schemeClr val="tx1"/>
                 </a:solidFill>
@@ -9434,7 +9434,7 @@
               <a:t>How can we design efficient aggregation algorithms for FL </a:t>
             </a:r>
             <a:r>
-              <a:rPr lang="en-US" sz="1400" kern="1200" dirty="0">
+              <a:rPr lang="en-US" sz="1400" strike="sngStrike" kern="1200" dirty="0">
                 <a:solidFill>
                   <a:schemeClr val="tx1"/>
                 </a:solidFill>

</xml_diff>